<commit_message>
Add formular to explain about linear function
</commit_message>
<xml_diff>
--- a/Thanh_W3_20190806.pptx
+++ b/Thanh_W3_20190806.pptx
@@ -11,9 +11,10 @@
     <p:sldId id="259" r:id="rId5"/>
     <p:sldId id="260" r:id="rId6"/>
     <p:sldId id="261" r:id="rId7"/>
-    <p:sldId id="262" r:id="rId8"/>
-    <p:sldId id="263" r:id="rId9"/>
-    <p:sldId id="264" r:id="rId10"/>
+    <p:sldId id="265" r:id="rId8"/>
+    <p:sldId id="262" r:id="rId9"/>
+    <p:sldId id="263" r:id="rId10"/>
+    <p:sldId id="264" r:id="rId11"/>
   </p:sldIdLst>
   <p:sldSz cx="9144000" cy="6858000" type="screen4x3"/>
   <p:notesSz cx="10231438" cy="7096125"/>
@@ -640,7 +641,7 @@
           <p:cNvPr id="1028" name="Picture 4" descr="Related image">
             <a:extLst>
               <a:ext uri="{FF2B5EF4-FFF2-40B4-BE49-F238E27FC236}">
-                <a16:creationId xmlns="" xmlns:a16="http://schemas.microsoft.com/office/drawing/2014/main" id="{413952F6-57D9-4045-B1A2-52FD5C5E4A52}"/>
+                <a16:creationId xmlns:a16="http://schemas.microsoft.com/office/drawing/2014/main" xmlns="" id="{413952F6-57D9-4045-B1A2-52FD5C5E4A52}"/>
               </a:ext>
             </a:extLst>
           </p:cNvPr>
@@ -3168,7 +3169,7 @@
           <p:cNvPr id="9" name="Picture 4" descr="Related image">
             <a:extLst>
               <a:ext uri="{FF2B5EF4-FFF2-40B4-BE49-F238E27FC236}">
-                <a16:creationId xmlns="" xmlns:a16="http://schemas.microsoft.com/office/drawing/2014/main" id="{7460A7AC-8B42-4CA0-B89E-D142DA5C9530}"/>
+                <a16:creationId xmlns:a16="http://schemas.microsoft.com/office/drawing/2014/main" xmlns="" id="{7460A7AC-8B42-4CA0-B89E-D142DA5C9530}"/>
               </a:ext>
             </a:extLst>
           </p:cNvPr>
@@ -3847,6 +3848,197 @@
     <p:extLst>
       <p:ext uri="{BB962C8B-B14F-4D97-AF65-F5344CB8AC3E}">
         <p14:creationId xmlns:p14="http://schemas.microsoft.com/office/powerpoint/2010/main" val="3776302584"/>
+      </p:ext>
+    </p:extLst>
+  </p:cSld>
+  <p:clrMapOvr>
+    <a:masterClrMapping/>
+  </p:clrMapOvr>
+  <p:timing>
+    <p:tnLst>
+      <p:par>
+        <p:cTn id="1" dur="indefinite" restart="never" nodeType="tmRoot"/>
+      </p:par>
+    </p:tnLst>
+  </p:timing>
+</p:sld>
+</file>
+
+<file path=ppt/slides/slide10.xml><?xml version="1.0" encoding="utf-8"?>
+<p:sld xmlns:a="http://schemas.openxmlformats.org/drawingml/2006/main" xmlns:r="http://schemas.openxmlformats.org/officeDocument/2006/relationships" xmlns:p="http://schemas.openxmlformats.org/presentationml/2006/main">
+  <p:cSld>
+    <p:spTree>
+      <p:nvGrpSpPr>
+        <p:cNvPr id="1" name=""/>
+        <p:cNvGrpSpPr/>
+        <p:nvPr/>
+      </p:nvGrpSpPr>
+      <p:grpSpPr>
+        <a:xfrm>
+          <a:off x="0" y="0"/>
+          <a:ext cx="0" cy="0"/>
+          <a:chOff x="0" y="0"/>
+          <a:chExt cx="0" cy="0"/>
+        </a:xfrm>
+      </p:grpSpPr>
+      <p:sp>
+        <p:nvSpPr>
+          <p:cNvPr id="2" name="Title 1"/>
+          <p:cNvSpPr>
+            <a:spLocks noGrp="1"/>
+          </p:cNvSpPr>
+          <p:nvPr>
+            <p:ph type="title"/>
+          </p:nvPr>
+        </p:nvSpPr>
+        <p:spPr/>
+        <p:txBody>
+          <a:bodyPr/>
+          <a:lstStyle/>
+          <a:p>
+            <a:endParaRPr lang="en-US" dirty="0"/>
+          </a:p>
+        </p:txBody>
+      </p:sp>
+      <p:sp>
+        <p:nvSpPr>
+          <p:cNvPr id="3" name="Content Placeholder 2"/>
+          <p:cNvSpPr>
+            <a:spLocks noGrp="1"/>
+          </p:cNvSpPr>
+          <p:nvPr>
+            <p:ph idx="1"/>
+          </p:nvPr>
+        </p:nvSpPr>
+        <p:spPr>
+          <a:scene3d>
+            <a:camera prst="orthographicFront"/>
+            <a:lightRig rig="threePt" dir="t"/>
+          </a:scene3d>
+          <a:sp3d>
+            <a:bevelT prst="angle"/>
+          </a:sp3d>
+        </p:spPr>
+        <p:txBody>
+          <a:bodyPr>
+            <a:sp3d extrusionH="57150">
+              <a:bevelT w="38100" h="38100" prst="slope"/>
+            </a:sp3d>
+          </a:bodyPr>
+          <a:lstStyle/>
+          <a:p>
+            <a:pPr marL="0" indent="0" algn="ctr">
+              <a:buNone/>
+            </a:pPr>
+            <a:endParaRPr lang="en-US" sz="5400" dirty="0" smtClean="0">
+              <a:solidFill>
+                <a:schemeClr val="tx2">
+                  <a:lumMod val="50000"/>
+                </a:schemeClr>
+              </a:solidFill>
+              <a:effectLst>
+                <a:innerShdw blurRad="63500" dist="50800" dir="10800000">
+                  <a:prstClr val="black">
+                    <a:alpha val="50000"/>
+                  </a:prstClr>
+                </a:innerShdw>
+                <a:reflection blurRad="6350" stA="55000" endA="300" endPos="45500" dir="5400000" sy="-100000" algn="bl" rotWithShape="0"/>
+              </a:effectLst>
+              <a:latin typeface="Times New Roman" panose="02020603050405020304" pitchFamily="18" charset="0"/>
+              <a:cs typeface="Times New Roman" panose="02020603050405020304" pitchFamily="18" charset="0"/>
+            </a:endParaRPr>
+          </a:p>
+          <a:p>
+            <a:pPr marL="0" indent="0" algn="ctr">
+              <a:buNone/>
+            </a:pPr>
+            <a:r>
+              <a:rPr lang="en-US" sz="5400" dirty="0" smtClean="0">
+                <a:solidFill>
+                  <a:schemeClr val="tx2">
+                    <a:lumMod val="50000"/>
+                  </a:schemeClr>
+                </a:solidFill>
+                <a:effectLst>
+                  <a:innerShdw blurRad="63500" dist="50800" dir="10800000">
+                    <a:prstClr val="black">
+                      <a:alpha val="50000"/>
+                    </a:prstClr>
+                  </a:innerShdw>
+                  <a:reflection blurRad="6350" stA="55000" endA="300" endPos="45500" dir="5400000" sy="-100000" algn="bl" rotWithShape="0"/>
+                </a:effectLst>
+                <a:latin typeface="Times New Roman" panose="02020603050405020304" pitchFamily="18" charset="0"/>
+                <a:cs typeface="Times New Roman" panose="02020603050405020304" pitchFamily="18" charset="0"/>
+              </a:rPr>
+              <a:t>Thank you for </a:t>
+            </a:r>
+            <a:r>
+              <a:rPr lang="en-US" sz="5400" dirty="0" smtClean="0">
+                <a:solidFill>
+                  <a:schemeClr val="tx2">
+                    <a:lumMod val="50000"/>
+                  </a:schemeClr>
+                </a:solidFill>
+                <a:effectLst>
+                  <a:innerShdw blurRad="63500" dist="50800" dir="18900000">
+                    <a:prstClr val="black">
+                      <a:alpha val="50000"/>
+                    </a:prstClr>
+                  </a:innerShdw>
+                  <a:reflection blurRad="6350" stA="55000" endA="300" endPos="45500" dir="5400000" sy="-100000" algn="bl" rotWithShape="0"/>
+                </a:effectLst>
+                <a:latin typeface="Times New Roman" panose="02020603050405020304" pitchFamily="18" charset="0"/>
+                <a:cs typeface="Times New Roman" panose="02020603050405020304" pitchFamily="18" charset="0"/>
+              </a:rPr>
+              <a:t>watching</a:t>
+            </a:r>
+            <a:endParaRPr lang="en-US" sz="5400" dirty="0">
+              <a:solidFill>
+                <a:schemeClr val="tx2">
+                  <a:lumMod val="50000"/>
+                </a:schemeClr>
+              </a:solidFill>
+              <a:effectLst>
+                <a:innerShdw blurRad="63500" dist="50800" dir="18900000">
+                  <a:prstClr val="black">
+                    <a:alpha val="50000"/>
+                  </a:prstClr>
+                </a:innerShdw>
+                <a:reflection blurRad="6350" stA="55000" endA="300" endPos="45500" dir="5400000" sy="-100000" algn="bl" rotWithShape="0"/>
+              </a:effectLst>
+              <a:latin typeface="Times New Roman" panose="02020603050405020304" pitchFamily="18" charset="0"/>
+              <a:cs typeface="Times New Roman" panose="02020603050405020304" pitchFamily="18" charset="0"/>
+            </a:endParaRPr>
+          </a:p>
+        </p:txBody>
+      </p:sp>
+      <p:sp>
+        <p:nvSpPr>
+          <p:cNvPr id="4" name="Slide Number Placeholder 3"/>
+          <p:cNvSpPr>
+            <a:spLocks noGrp="1"/>
+          </p:cNvSpPr>
+          <p:nvPr>
+            <p:ph type="sldNum" sz="quarter" idx="10"/>
+          </p:nvPr>
+        </p:nvSpPr>
+        <p:spPr/>
+        <p:txBody>
+          <a:bodyPr/>
+          <a:lstStyle/>
+          <a:p>
+            <a:fld id="{6376B962-9A28-45C6-BBAD-D5665CAF4927}" type="slidenum">
+              <a:rPr lang="ko-KR" altLang="en-US" smtClean="0"/>
+              <a:t>10</a:t>
+            </a:fld>
+            <a:endParaRPr lang="ko-KR" altLang="en-US"/>
+          </a:p>
+        </p:txBody>
+      </p:sp>
+    </p:spTree>
+    <p:extLst>
+      <p:ext uri="{BB962C8B-B14F-4D97-AF65-F5344CB8AC3E}">
+        <p14:creationId xmlns:p14="http://schemas.microsoft.com/office/powerpoint/2010/main" val="1436968073"/>
       </p:ext>
     </p:extLst>
   </p:cSld>
@@ -13389,7 +13581,7 @@
           <p:cNvPr id="10" name="TextBox 9">
             <a:extLst>
               <a:ext uri="{FF2B5EF4-FFF2-40B4-BE49-F238E27FC236}">
-                <a16:creationId xmlns="" xmlns:a16="http://schemas.microsoft.com/office/drawing/2014/main" id="{B3BE764F-840B-4185-A1D3-4AFF02C9A346}"/>
+                <a16:creationId xmlns:a16="http://schemas.microsoft.com/office/drawing/2014/main" xmlns="" id="{B3BE764F-840B-4185-A1D3-4AFF02C9A346}"/>
               </a:ext>
             </a:extLst>
           </p:cNvPr>
@@ -13426,7 +13618,7 @@
               <p:cNvPr id="11" name="TextBox 10">
                 <a:extLst>
                   <a:ext uri="{FF2B5EF4-FFF2-40B4-BE49-F238E27FC236}">
-                    <a16:creationId xmlns="" xmlns:a16="http://schemas.microsoft.com/office/drawing/2014/main" id="{F32EF695-D822-4CD0-93EA-C789A467DF0E}"/>
+                    <a16:creationId xmlns:a16="http://schemas.microsoft.com/office/drawing/2014/main" xmlns="" id="{F32EF695-D822-4CD0-93EA-C789A467DF0E}"/>
                   </a:ext>
                 </a:extLst>
               </p:cNvPr>
@@ -13721,7 +13913,7 @@
           <p:cNvPr id="26" name="Group 25">
             <a:extLst>
               <a:ext uri="{FF2B5EF4-FFF2-40B4-BE49-F238E27FC236}">
-                <a16:creationId xmlns="" xmlns:a16="http://schemas.microsoft.com/office/drawing/2014/main" id="{1A8CAC6B-0036-4614-9FDB-C7020A9985AA}"/>
+                <a16:creationId xmlns:a16="http://schemas.microsoft.com/office/drawing/2014/main" xmlns="" id="{1A8CAC6B-0036-4614-9FDB-C7020A9985AA}"/>
               </a:ext>
             </a:extLst>
           </p:cNvPr>
@@ -13743,7 +13935,7 @@
                 <p:cNvPr id="27" name="TextBox 26">
                   <a:extLst>
                     <a:ext uri="{FF2B5EF4-FFF2-40B4-BE49-F238E27FC236}">
-                      <a16:creationId xmlns="" xmlns:a16="http://schemas.microsoft.com/office/drawing/2014/main" id="{65B35C1C-C280-4BC3-8A42-140C2FD092AE}"/>
+                      <a16:creationId xmlns:a16="http://schemas.microsoft.com/office/drawing/2014/main" xmlns="" id="{65B35C1C-C280-4BC3-8A42-140C2FD092AE}"/>
                     </a:ext>
                   </a:extLst>
                 </p:cNvPr>
@@ -13913,7 +14105,7 @@
                 <p:cNvPr id="28" name="Rectangle 27">
                   <a:extLst>
                     <a:ext uri="{FF2B5EF4-FFF2-40B4-BE49-F238E27FC236}">
-                      <a16:creationId xmlns="" xmlns:a16="http://schemas.microsoft.com/office/drawing/2014/main" id="{B616E260-847E-49B9-88FF-5545D9D60DC2}"/>
+                      <a16:creationId xmlns:a16="http://schemas.microsoft.com/office/drawing/2014/main" xmlns="" id="{B616E260-847E-49B9-88FF-5545D9D60DC2}"/>
                     </a:ext>
                   </a:extLst>
                 </p:cNvPr>
@@ -14039,7 +14231,7 @@
                 <p:cNvPr id="29" name="Rectangle 28">
                   <a:extLst>
                     <a:ext uri="{FF2B5EF4-FFF2-40B4-BE49-F238E27FC236}">
-                      <a16:creationId xmlns="" xmlns:a16="http://schemas.microsoft.com/office/drawing/2014/main" id="{7C9D4DD0-7A65-4590-B5DD-80478E03A349}"/>
+                      <a16:creationId xmlns:a16="http://schemas.microsoft.com/office/drawing/2014/main" xmlns="" id="{7C9D4DD0-7A65-4590-B5DD-80478E03A349}"/>
                     </a:ext>
                   </a:extLst>
                 </p:cNvPr>
@@ -14153,7 +14345,7 @@
                 <p:cNvPr id="30" name="Rectangle 29">
                   <a:extLst>
                     <a:ext uri="{FF2B5EF4-FFF2-40B4-BE49-F238E27FC236}">
-                      <a16:creationId xmlns="" xmlns:a16="http://schemas.microsoft.com/office/drawing/2014/main" id="{51A0F09D-874B-48A7-BC99-008457CD6E78}"/>
+                      <a16:creationId xmlns:a16="http://schemas.microsoft.com/office/drawing/2014/main" xmlns="" id="{51A0F09D-874B-48A7-BC99-008457CD6E78}"/>
                     </a:ext>
                   </a:extLst>
                 </p:cNvPr>
@@ -14279,7 +14471,7 @@
                 <p:cNvPr id="31" name="Rectangle 30">
                   <a:extLst>
                     <a:ext uri="{FF2B5EF4-FFF2-40B4-BE49-F238E27FC236}">
-                      <a16:creationId xmlns="" xmlns:a16="http://schemas.microsoft.com/office/drawing/2014/main" id="{DC84FFD3-B757-4459-ABB2-38E1DBF2FCD4}"/>
+                      <a16:creationId xmlns:a16="http://schemas.microsoft.com/office/drawing/2014/main" xmlns="" id="{DC84FFD3-B757-4459-ABB2-38E1DBF2FCD4}"/>
                     </a:ext>
                   </a:extLst>
                 </p:cNvPr>
@@ -14373,7 +14565,7 @@
             <p:cNvPr id="32" name="Straight Connector 31">
               <a:extLst>
                 <a:ext uri="{FF2B5EF4-FFF2-40B4-BE49-F238E27FC236}">
-                  <a16:creationId xmlns="" xmlns:a16="http://schemas.microsoft.com/office/drawing/2014/main" id="{914CC413-0B1B-47B6-A7B3-91BBEEF87A06}"/>
+                  <a16:creationId xmlns:a16="http://schemas.microsoft.com/office/drawing/2014/main" xmlns="" id="{914CC413-0B1B-47B6-A7B3-91BBEEF87A06}"/>
                 </a:ext>
               </a:extLst>
             </p:cNvPr>
@@ -14415,7 +14607,7 @@
             <p:cNvPr id="33" name="Straight Connector 32">
               <a:extLst>
                 <a:ext uri="{FF2B5EF4-FFF2-40B4-BE49-F238E27FC236}">
-                  <a16:creationId xmlns="" xmlns:a16="http://schemas.microsoft.com/office/drawing/2014/main" id="{A0A1CA20-4C9A-420F-A923-2F21757BE002}"/>
+                  <a16:creationId xmlns:a16="http://schemas.microsoft.com/office/drawing/2014/main" xmlns="" id="{A0A1CA20-4C9A-420F-A923-2F21757BE002}"/>
                 </a:ext>
               </a:extLst>
             </p:cNvPr>
@@ -14457,7 +14649,7 @@
             <p:cNvPr id="34" name="Straight Connector 33">
               <a:extLst>
                 <a:ext uri="{FF2B5EF4-FFF2-40B4-BE49-F238E27FC236}">
-                  <a16:creationId xmlns="" xmlns:a16="http://schemas.microsoft.com/office/drawing/2014/main" id="{95BBC0CE-6F60-41DC-B0E3-DA113D319FF5}"/>
+                  <a16:creationId xmlns:a16="http://schemas.microsoft.com/office/drawing/2014/main" xmlns="" id="{95BBC0CE-6F60-41DC-B0E3-DA113D319FF5}"/>
                 </a:ext>
               </a:extLst>
             </p:cNvPr>
@@ -14499,7 +14691,7 @@
             <p:cNvPr id="35" name="Straight Connector 34">
               <a:extLst>
                 <a:ext uri="{FF2B5EF4-FFF2-40B4-BE49-F238E27FC236}">
-                  <a16:creationId xmlns="" xmlns:a16="http://schemas.microsoft.com/office/drawing/2014/main" id="{ADC26EAF-D2E7-4E85-919E-C910014CD6C1}"/>
+                  <a16:creationId xmlns:a16="http://schemas.microsoft.com/office/drawing/2014/main" xmlns="" id="{ADC26EAF-D2E7-4E85-919E-C910014CD6C1}"/>
                 </a:ext>
               </a:extLst>
             </p:cNvPr>
@@ -14541,7 +14733,7 @@
             <p:cNvPr id="36" name="Straight Connector 35">
               <a:extLst>
                 <a:ext uri="{FF2B5EF4-FFF2-40B4-BE49-F238E27FC236}">
-                  <a16:creationId xmlns="" xmlns:a16="http://schemas.microsoft.com/office/drawing/2014/main" id="{251DA2E2-0999-4831-806F-9A51B7F80578}"/>
+                  <a16:creationId xmlns:a16="http://schemas.microsoft.com/office/drawing/2014/main" xmlns="" id="{251DA2E2-0999-4831-806F-9A51B7F80578}"/>
                 </a:ext>
               </a:extLst>
             </p:cNvPr>
@@ -14583,7 +14775,7 @@
             <p:cNvPr id="37" name="Straight Connector 36">
               <a:extLst>
                 <a:ext uri="{FF2B5EF4-FFF2-40B4-BE49-F238E27FC236}">
-                  <a16:creationId xmlns="" xmlns:a16="http://schemas.microsoft.com/office/drawing/2014/main" id="{E70F364D-1171-4CFA-9CCD-4939C6AF12E4}"/>
+                  <a16:creationId xmlns:a16="http://schemas.microsoft.com/office/drawing/2014/main" xmlns="" id="{E70F364D-1171-4CFA-9CCD-4939C6AF12E4}"/>
                 </a:ext>
               </a:extLst>
             </p:cNvPr>
@@ -16759,7 +16951,7 @@
                 <p:cNvPr id="72" name="Rectangle 71">
                   <a:extLst>
                     <a:ext uri="{FF2B5EF4-FFF2-40B4-BE49-F238E27FC236}">
-                      <a16:creationId xmlns="" xmlns:a16="http://schemas.microsoft.com/office/drawing/2014/main" id="{DC84FFD3-B757-4459-ABB2-38E1DBF2FCD4}"/>
+                      <a16:creationId xmlns:a16="http://schemas.microsoft.com/office/drawing/2014/main" xmlns="" id="{DC84FFD3-B757-4459-ABB2-38E1DBF2FCD4}"/>
                     </a:ext>
                   </a:extLst>
                 </p:cNvPr>
@@ -16876,7 +17068,7 @@
                   <p:cNvPr id="68" name="TextBox 67">
                     <a:extLst>
                       <a:ext uri="{FF2B5EF4-FFF2-40B4-BE49-F238E27FC236}">
-                        <a16:creationId xmlns="" xmlns:a16="http://schemas.microsoft.com/office/drawing/2014/main" id="{65B35C1C-C280-4BC3-8A42-140C2FD092AE}"/>
+                        <a16:creationId xmlns:a16="http://schemas.microsoft.com/office/drawing/2014/main" xmlns="" id="{65B35C1C-C280-4BC3-8A42-140C2FD092AE}"/>
                       </a:ext>
                     </a:extLst>
                   </p:cNvPr>
@@ -17078,7 +17270,7 @@
                   <p:cNvPr id="69" name="Rectangle 68">
                     <a:extLst>
                       <a:ext uri="{FF2B5EF4-FFF2-40B4-BE49-F238E27FC236}">
-                        <a16:creationId xmlns="" xmlns:a16="http://schemas.microsoft.com/office/drawing/2014/main" id="{B616E260-847E-49B9-88FF-5545D9D60DC2}"/>
+                        <a16:creationId xmlns:a16="http://schemas.microsoft.com/office/drawing/2014/main" xmlns="" id="{B616E260-847E-49B9-88FF-5545D9D60DC2}"/>
                       </a:ext>
                     </a:extLst>
                   </p:cNvPr>
@@ -17221,7 +17413,7 @@
               <p:cNvPr id="73" name="Straight Connector 72">
                 <a:extLst>
                   <a:ext uri="{FF2B5EF4-FFF2-40B4-BE49-F238E27FC236}">
-                    <a16:creationId xmlns="" xmlns:a16="http://schemas.microsoft.com/office/drawing/2014/main" id="{914CC413-0B1B-47B6-A7B3-91BBEEF87A06}"/>
+                    <a16:creationId xmlns:a16="http://schemas.microsoft.com/office/drawing/2014/main" xmlns="" id="{914CC413-0B1B-47B6-A7B3-91BBEEF87A06}"/>
                   </a:ext>
                 </a:extLst>
               </p:cNvPr>
@@ -17263,7 +17455,7 @@
               <p:cNvPr id="76" name="Straight Connector 75">
                 <a:extLst>
                   <a:ext uri="{FF2B5EF4-FFF2-40B4-BE49-F238E27FC236}">
-                    <a16:creationId xmlns="" xmlns:a16="http://schemas.microsoft.com/office/drawing/2014/main" id="{ADC26EAF-D2E7-4E85-919E-C910014CD6C1}"/>
+                    <a16:creationId xmlns:a16="http://schemas.microsoft.com/office/drawing/2014/main" xmlns="" id="{ADC26EAF-D2E7-4E85-919E-C910014CD6C1}"/>
                   </a:ext>
                 </a:extLst>
               </p:cNvPr>
@@ -17321,7 +17513,7 @@
                     <p:cNvPr id="70" name="Rectangle 69">
                       <a:extLst>
                         <a:ext uri="{FF2B5EF4-FFF2-40B4-BE49-F238E27FC236}">
-                          <a16:creationId xmlns="" xmlns:a16="http://schemas.microsoft.com/office/drawing/2014/main" id="{7C9D4DD0-7A65-4590-B5DD-80478E03A349}"/>
+                          <a16:creationId xmlns:a16="http://schemas.microsoft.com/office/drawing/2014/main" xmlns="" id="{7C9D4DD0-7A65-4590-B5DD-80478E03A349}"/>
                         </a:ext>
                       </a:extLst>
                     </p:cNvPr>
@@ -17464,7 +17656,7 @@
                 <p:cNvPr id="74" name="Straight Connector 73">
                   <a:extLst>
                     <a:ext uri="{FF2B5EF4-FFF2-40B4-BE49-F238E27FC236}">
-                      <a16:creationId xmlns="" xmlns:a16="http://schemas.microsoft.com/office/drawing/2014/main" id="{A0A1CA20-4C9A-420F-A923-2F21757BE002}"/>
+                      <a16:creationId xmlns:a16="http://schemas.microsoft.com/office/drawing/2014/main" xmlns="" id="{A0A1CA20-4C9A-420F-A923-2F21757BE002}"/>
                     </a:ext>
                   </a:extLst>
                 </p:cNvPr>
@@ -17506,7 +17698,7 @@
                 <p:cNvPr id="77" name="Straight Connector 76">
                   <a:extLst>
                     <a:ext uri="{FF2B5EF4-FFF2-40B4-BE49-F238E27FC236}">
-                      <a16:creationId xmlns="" xmlns:a16="http://schemas.microsoft.com/office/drawing/2014/main" id="{251DA2E2-0999-4831-806F-9A51B7F80578}"/>
+                      <a16:creationId xmlns:a16="http://schemas.microsoft.com/office/drawing/2014/main" xmlns="" id="{251DA2E2-0999-4831-806F-9A51B7F80578}"/>
                     </a:ext>
                   </a:extLst>
                 </p:cNvPr>
@@ -17565,7 +17757,7 @@
                     <p:cNvPr id="81" name="Rectangle 80">
                       <a:extLst>
                         <a:ext uri="{FF2B5EF4-FFF2-40B4-BE49-F238E27FC236}">
-                          <a16:creationId xmlns="" xmlns:a16="http://schemas.microsoft.com/office/drawing/2014/main" id="{7C9D4DD0-7A65-4590-B5DD-80478E03A349}"/>
+                          <a16:creationId xmlns:a16="http://schemas.microsoft.com/office/drawing/2014/main" xmlns="" id="{7C9D4DD0-7A65-4590-B5DD-80478E03A349}"/>
                         </a:ext>
                       </a:extLst>
                     </p:cNvPr>
@@ -17708,7 +17900,7 @@
                 <p:cNvPr id="82" name="Straight Connector 81">
                   <a:extLst>
                     <a:ext uri="{FF2B5EF4-FFF2-40B4-BE49-F238E27FC236}">
-                      <a16:creationId xmlns="" xmlns:a16="http://schemas.microsoft.com/office/drawing/2014/main" id="{A0A1CA20-4C9A-420F-A923-2F21757BE002}"/>
+                      <a16:creationId xmlns:a16="http://schemas.microsoft.com/office/drawing/2014/main" xmlns="" id="{A0A1CA20-4C9A-420F-A923-2F21757BE002}"/>
                     </a:ext>
                   </a:extLst>
                 </p:cNvPr>
@@ -17750,7 +17942,7 @@
                 <p:cNvPr id="83" name="Straight Connector 82">
                   <a:extLst>
                     <a:ext uri="{FF2B5EF4-FFF2-40B4-BE49-F238E27FC236}">
-                      <a16:creationId xmlns="" xmlns:a16="http://schemas.microsoft.com/office/drawing/2014/main" id="{251DA2E2-0999-4831-806F-9A51B7F80578}"/>
+                      <a16:creationId xmlns:a16="http://schemas.microsoft.com/office/drawing/2014/main" xmlns="" id="{251DA2E2-0999-4831-806F-9A51B7F80578}"/>
                     </a:ext>
                   </a:extLst>
                 </p:cNvPr>
@@ -20987,11 +21179,7 @@
                       </a:r>
                       <a:r>
                         <a:rPr lang="en-US" sz="1600" baseline="0" dirty="0" smtClean="0"/>
-                        <a:t> </a:t>
-                      </a:r>
-                      <a:r>
-                        <a:rPr lang="en-US" sz="1600" baseline="0" dirty="0" smtClean="0"/>
-                        <a:t>≈0 -&gt; parameter not update</a:t>
+                        <a:t> ≈0 -&gt; parameter not update</a:t>
                       </a:r>
                       <a:endParaRPr lang="en-US" sz="1600" dirty="0"/>
                     </a:p>
@@ -21324,6 +21512,1727 @@
           <a:lstStyle/>
           <a:p>
             <a:r>
+              <a:rPr lang="en-US" dirty="0"/>
+              <a:t>Activation </a:t>
+            </a:r>
+            <a:r>
+              <a:rPr lang="en-US" dirty="0" smtClean="0"/>
+              <a:t>Function(2)</a:t>
+            </a:r>
+            <a:endParaRPr lang="en-US" dirty="0"/>
+          </a:p>
+        </p:txBody>
+      </p:sp>
+      <mc:AlternateContent xmlns:mc="http://schemas.openxmlformats.org/markup-compatibility/2006">
+        <mc:Choice xmlns:a14="http://schemas.microsoft.com/office/drawing/2010/main" Requires="a14">
+          <p:sp>
+            <p:nvSpPr>
+              <p:cNvPr id="3" name="Content Placeholder 2"/>
+              <p:cNvSpPr>
+                <a:spLocks noGrp="1"/>
+              </p:cNvSpPr>
+              <p:nvPr>
+                <p:ph idx="1"/>
+              </p:nvPr>
+            </p:nvSpPr>
+            <p:spPr/>
+            <p:txBody>
+              <a:bodyPr/>
+              <a:lstStyle/>
+              <a:p>
+                <a:r>
+                  <a:rPr lang="en-US" dirty="0" smtClean="0"/>
+                  <a:t>Explain about linear function</a:t>
+                </a:r>
+              </a:p>
+              <a:p>
+                <a:pPr marL="0" indent="0">
+                  <a:buNone/>
+                </a:pPr>
+                <a:r>
+                  <a:rPr lang="en-US" dirty="0" smtClean="0"/>
+                  <a:t>If activation function is linear: </a:t>
+                </a:r>
+                <a14:m>
+                  <m:oMath xmlns:m="http://schemas.openxmlformats.org/officeDocument/2006/math">
+                    <m:sSup>
+                      <m:sSupPr>
+                        <m:ctrlPr>
+                          <a:rPr lang="en-US" i="1">
+                            <a:latin typeface="Cambria Math" panose="02040503050406030204" pitchFamily="18" charset="0"/>
+                          </a:rPr>
+                        </m:ctrlPr>
+                      </m:sSupPr>
+                      <m:e>
+                        <m:r>
+                          <a:rPr lang="en-US" b="1" i="1">
+                            <a:latin typeface="Cambria Math" panose="02040503050406030204" pitchFamily="18" charset="0"/>
+                          </a:rPr>
+                          <m:t>𝒛</m:t>
+                        </m:r>
+                      </m:e>
+                      <m:sup>
+                        <m:r>
+                          <a:rPr lang="en-US" i="1">
+                            <a:latin typeface="Cambria Math" panose="02040503050406030204" pitchFamily="18" charset="0"/>
+                          </a:rPr>
+                          <m:t>[1]</m:t>
+                        </m:r>
+                      </m:sup>
+                    </m:sSup>
+                    <m:r>
+                      <a:rPr lang="en-US" i="1">
+                        <a:latin typeface="Cambria Math" panose="02040503050406030204" pitchFamily="18" charset="0"/>
+                      </a:rPr>
+                      <m:t>=</m:t>
+                    </m:r>
+                    <m:sSup>
+                      <m:sSupPr>
+                        <m:ctrlPr>
+                          <a:rPr lang="en-US" i="1">
+                            <a:latin typeface="Cambria Math" panose="02040503050406030204" pitchFamily="18" charset="0"/>
+                          </a:rPr>
+                        </m:ctrlPr>
+                      </m:sSupPr>
+                      <m:e>
+                        <m:r>
+                          <a:rPr lang="en-US" b="1" i="1">
+                            <a:latin typeface="Cambria Math" panose="02040503050406030204" pitchFamily="18" charset="0"/>
+                          </a:rPr>
+                          <m:t>𝒘</m:t>
+                        </m:r>
+                      </m:e>
+                      <m:sup>
+                        <m:r>
+                          <a:rPr lang="en-US" i="1">
+                            <a:latin typeface="Cambria Math" panose="02040503050406030204" pitchFamily="18" charset="0"/>
+                          </a:rPr>
+                          <m:t>[1]</m:t>
+                        </m:r>
+                      </m:sup>
+                    </m:sSup>
+                  </m:oMath>
+                </a14:m>
+                <a:r>
+                  <a:rPr lang="en-US" b="1" dirty="0">
+                    <a:ea typeface="Cambria Math" panose="02040503050406030204" pitchFamily="18" charset="0"/>
+                  </a:rPr>
+                  <a:t> </a:t>
+                </a:r>
+                <a14:m>
+                  <m:oMath xmlns:m="http://schemas.openxmlformats.org/officeDocument/2006/math">
+                    <m:r>
+                      <a:rPr lang="en-US" b="1" i="1">
+                        <a:latin typeface="Cambria Math" panose="02040503050406030204" pitchFamily="18" charset="0"/>
+                        <a:ea typeface="Cambria Math" panose="02040503050406030204" pitchFamily="18" charset="0"/>
+                      </a:rPr>
+                      <m:t>𝒙</m:t>
+                    </m:r>
+                    <m:r>
+                      <a:rPr lang="en-US" b="1" i="1">
+                        <a:latin typeface="Cambria Math" panose="02040503050406030204" pitchFamily="18" charset="0"/>
+                        <a:ea typeface="Cambria Math" panose="02040503050406030204" pitchFamily="18" charset="0"/>
+                      </a:rPr>
+                      <m:t> </m:t>
+                    </m:r>
+                  </m:oMath>
+                </a14:m>
+                <a:r>
+                  <a:rPr lang="en-US" dirty="0"/>
+                  <a:t>+</a:t>
+                </a:r>
+                <a14:m>
+                  <m:oMath xmlns:m="http://schemas.openxmlformats.org/officeDocument/2006/math">
+                    <m:sSup>
+                      <m:sSupPr>
+                        <m:ctrlPr>
+                          <a:rPr lang="en-US" i="1">
+                            <a:latin typeface="Cambria Math" panose="02040503050406030204" pitchFamily="18" charset="0"/>
+                          </a:rPr>
+                        </m:ctrlPr>
+                      </m:sSupPr>
+                      <m:e>
+                        <m:r>
+                          <a:rPr lang="en-US" b="1" i="1">
+                            <a:latin typeface="Cambria Math" panose="02040503050406030204" pitchFamily="18" charset="0"/>
+                          </a:rPr>
+                          <m:t>𝒃</m:t>
+                        </m:r>
+                      </m:e>
+                      <m:sup>
+                        <m:r>
+                          <a:rPr lang="en-US" i="1">
+                            <a:latin typeface="Cambria Math" panose="02040503050406030204" pitchFamily="18" charset="0"/>
+                          </a:rPr>
+                          <m:t>[1]</m:t>
+                        </m:r>
+                      </m:sup>
+                    </m:sSup>
+                    <m:r>
+                      <a:rPr lang="en-US" b="0" i="1" smtClean="0">
+                        <a:latin typeface="Cambria Math" panose="02040503050406030204" pitchFamily="18" charset="0"/>
+                      </a:rPr>
+                      <m:t>→</m:t>
+                    </m:r>
+                    <m:sSup>
+                      <m:sSupPr>
+                        <m:ctrlPr>
+                          <a:rPr lang="en-US" i="1">
+                            <a:latin typeface="Cambria Math" panose="02040503050406030204" pitchFamily="18" charset="0"/>
+                          </a:rPr>
+                        </m:ctrlPr>
+                      </m:sSupPr>
+                      <m:e>
+                        <m:r>
+                          <a:rPr lang="en-US" b="1" i="1">
+                            <a:latin typeface="Cambria Math" panose="02040503050406030204" pitchFamily="18" charset="0"/>
+                          </a:rPr>
+                          <m:t>𝒂</m:t>
+                        </m:r>
+                      </m:e>
+                      <m:sup>
+                        <m:r>
+                          <a:rPr lang="en-US" i="1">
+                            <a:latin typeface="Cambria Math" panose="02040503050406030204" pitchFamily="18" charset="0"/>
+                          </a:rPr>
+                          <m:t>[1]</m:t>
+                        </m:r>
+                      </m:sup>
+                    </m:sSup>
+                    <m:r>
+                      <a:rPr lang="en-US" i="1">
+                        <a:latin typeface="Cambria Math" panose="02040503050406030204" pitchFamily="18" charset="0"/>
+                      </a:rPr>
+                      <m:t>=</m:t>
+                    </m:r>
+                    <m:r>
+                      <m:rPr>
+                        <m:nor/>
+                      </m:rPr>
+                      <a:rPr lang="en-US" b="1" dirty="0"/>
+                      <m:t> </m:t>
+                    </m:r>
+                    <m:r>
+                      <a:rPr lang="en-US" b="1" i="1" dirty="0">
+                        <a:latin typeface="Cambria Math" panose="02040503050406030204" pitchFamily="18" charset="0"/>
+                      </a:rPr>
+                      <m:t>𝝈</m:t>
+                    </m:r>
+                    <m:r>
+                      <m:rPr>
+                        <m:nor/>
+                      </m:rPr>
+                      <a:rPr lang="en-US" dirty="0"/>
+                      <m:t>(</m:t>
+                    </m:r>
+                    <m:sSup>
+                      <m:sSupPr>
+                        <m:ctrlPr>
+                          <a:rPr lang="en-US" i="1">
+                            <a:latin typeface="Cambria Math" panose="02040503050406030204" pitchFamily="18" charset="0"/>
+                          </a:rPr>
+                        </m:ctrlPr>
+                      </m:sSupPr>
+                      <m:e>
+                        <m:r>
+                          <a:rPr lang="en-US" b="1" i="1">
+                            <a:latin typeface="Cambria Math" panose="02040503050406030204" pitchFamily="18" charset="0"/>
+                          </a:rPr>
+                          <m:t>𝒛</m:t>
+                        </m:r>
+                      </m:e>
+                      <m:sup>
+                        <m:r>
+                          <a:rPr lang="en-US" i="1">
+                            <a:latin typeface="Cambria Math" panose="02040503050406030204" pitchFamily="18" charset="0"/>
+                          </a:rPr>
+                          <m:t>[1]</m:t>
+                        </m:r>
+                      </m:sup>
+                    </m:sSup>
+                    <m:r>
+                      <m:rPr>
+                        <m:nor/>
+                      </m:rPr>
+                      <a:rPr lang="en-US" dirty="0"/>
+                      <m:t>)</m:t>
+                    </m:r>
+                    <m:r>
+                      <m:rPr>
+                        <m:nor/>
+                      </m:rPr>
+                      <a:rPr lang="en-US" b="0" i="0" dirty="0" smtClean="0"/>
+                      <m:t> = </m:t>
+                    </m:r>
+                    <m:sSup>
+                      <m:sSupPr>
+                        <m:ctrlPr>
+                          <a:rPr lang="en-US" i="1">
+                            <a:latin typeface="Cambria Math" panose="02040503050406030204" pitchFamily="18" charset="0"/>
+                          </a:rPr>
+                        </m:ctrlPr>
+                      </m:sSupPr>
+                      <m:e>
+                        <m:r>
+                          <a:rPr lang="en-US" b="1" i="1">
+                            <a:latin typeface="Cambria Math" panose="02040503050406030204" pitchFamily="18" charset="0"/>
+                          </a:rPr>
+                          <m:t>𝒛</m:t>
+                        </m:r>
+                      </m:e>
+                      <m:sup>
+                        <m:r>
+                          <a:rPr lang="en-US" i="1">
+                            <a:latin typeface="Cambria Math" panose="02040503050406030204" pitchFamily="18" charset="0"/>
+                          </a:rPr>
+                          <m:t>[1]</m:t>
+                        </m:r>
+                      </m:sup>
+                    </m:sSup>
+                  </m:oMath>
+                </a14:m>
+                <a:endParaRPr lang="en-US" dirty="0"/>
+              </a:p>
+              <a:p>
+                <a:pPr marL="0" indent="0">
+                  <a:buNone/>
+                </a:pPr>
+                <a:r>
+                  <a:rPr lang="en-US" dirty="0" smtClean="0"/>
+                  <a:t>Layer output:  </a:t>
+                </a:r>
+                <a14:m>
+                  <m:oMath xmlns:m="http://schemas.openxmlformats.org/officeDocument/2006/math">
+                    <m:sSup>
+                      <m:sSupPr>
+                        <m:ctrlPr>
+                          <a:rPr lang="en-US" i="1">
+                            <a:latin typeface="Cambria Math" panose="02040503050406030204" pitchFamily="18" charset="0"/>
+                          </a:rPr>
+                        </m:ctrlPr>
+                      </m:sSupPr>
+                      <m:e>
+                        <m:r>
+                          <a:rPr lang="en-US" i="1">
+                            <a:latin typeface="Cambria Math" panose="02040503050406030204" pitchFamily="18" charset="0"/>
+                          </a:rPr>
+                          <m:t>𝑧</m:t>
+                        </m:r>
+                      </m:e>
+                      <m:sup>
+                        <m:r>
+                          <a:rPr lang="en-US" i="1">
+                            <a:latin typeface="Cambria Math" panose="02040503050406030204" pitchFamily="18" charset="0"/>
+                          </a:rPr>
+                          <m:t>[</m:t>
+                        </m:r>
+                        <m:r>
+                          <a:rPr lang="en-US" i="1">
+                            <a:latin typeface="Cambria Math" panose="02040503050406030204" pitchFamily="18" charset="0"/>
+                          </a:rPr>
+                          <m:t>2</m:t>
+                        </m:r>
+                        <m:r>
+                          <a:rPr lang="en-US" i="1">
+                            <a:latin typeface="Cambria Math" panose="02040503050406030204" pitchFamily="18" charset="0"/>
+                          </a:rPr>
+                          <m:t>]</m:t>
+                        </m:r>
+                      </m:sup>
+                    </m:sSup>
+                    <m:r>
+                      <a:rPr lang="en-US" i="1">
+                        <a:latin typeface="Cambria Math" panose="02040503050406030204" pitchFamily="18" charset="0"/>
+                      </a:rPr>
+                      <m:t>=</m:t>
+                    </m:r>
+                    <m:sSup>
+                      <m:sSupPr>
+                        <m:ctrlPr>
+                          <a:rPr lang="en-US" i="1">
+                            <a:latin typeface="Cambria Math" panose="02040503050406030204" pitchFamily="18" charset="0"/>
+                          </a:rPr>
+                        </m:ctrlPr>
+                      </m:sSupPr>
+                      <m:e>
+                        <m:r>
+                          <a:rPr lang="en-US" b="1" i="1">
+                            <a:latin typeface="Cambria Math" panose="02040503050406030204" pitchFamily="18" charset="0"/>
+                          </a:rPr>
+                          <m:t>𝒘</m:t>
+                        </m:r>
+                      </m:e>
+                      <m:sup>
+                        <m:r>
+                          <a:rPr lang="en-US" i="1">
+                            <a:latin typeface="Cambria Math" panose="02040503050406030204" pitchFamily="18" charset="0"/>
+                          </a:rPr>
+                          <m:t>[</m:t>
+                        </m:r>
+                        <m:r>
+                          <a:rPr lang="en-US" i="1">
+                            <a:latin typeface="Cambria Math" panose="02040503050406030204" pitchFamily="18" charset="0"/>
+                          </a:rPr>
+                          <m:t>2</m:t>
+                        </m:r>
+                        <m:r>
+                          <a:rPr lang="en-US" i="1">
+                            <a:latin typeface="Cambria Math" panose="02040503050406030204" pitchFamily="18" charset="0"/>
+                          </a:rPr>
+                          <m:t>]</m:t>
+                        </m:r>
+                      </m:sup>
+                    </m:sSup>
+                    <m:sSup>
+                      <m:sSupPr>
+                        <m:ctrlPr>
+                          <a:rPr lang="en-US" i="1">
+                            <a:latin typeface="Cambria Math" panose="02040503050406030204" pitchFamily="18" charset="0"/>
+                          </a:rPr>
+                        </m:ctrlPr>
+                      </m:sSupPr>
+                      <m:e>
+                        <m:r>
+                          <a:rPr lang="en-US" b="1" i="1">
+                            <a:latin typeface="Cambria Math" panose="02040503050406030204" pitchFamily="18" charset="0"/>
+                          </a:rPr>
+                          <m:t>𝒂</m:t>
+                        </m:r>
+                      </m:e>
+                      <m:sup>
+                        <m:r>
+                          <a:rPr lang="en-US" i="1">
+                            <a:latin typeface="Cambria Math" panose="02040503050406030204" pitchFamily="18" charset="0"/>
+                          </a:rPr>
+                          <m:t>[1]</m:t>
+                        </m:r>
+                      </m:sup>
+                    </m:sSup>
+                  </m:oMath>
+                </a14:m>
+                <a:r>
+                  <a:rPr lang="en-US" dirty="0"/>
+                  <a:t>+</a:t>
+                </a:r>
+                <a14:m>
+                  <m:oMath xmlns:m="http://schemas.openxmlformats.org/officeDocument/2006/math">
+                    <m:sSup>
+                      <m:sSupPr>
+                        <m:ctrlPr>
+                          <a:rPr lang="en-US" i="1">
+                            <a:latin typeface="Cambria Math" panose="02040503050406030204" pitchFamily="18" charset="0"/>
+                          </a:rPr>
+                        </m:ctrlPr>
+                      </m:sSupPr>
+                      <m:e>
+                        <m:r>
+                          <a:rPr lang="en-US" i="1">
+                            <a:latin typeface="Cambria Math" panose="02040503050406030204" pitchFamily="18" charset="0"/>
+                          </a:rPr>
+                          <m:t>𝑏</m:t>
+                        </m:r>
+                      </m:e>
+                      <m:sup>
+                        <m:r>
+                          <a:rPr lang="en-US" i="1">
+                            <a:latin typeface="Cambria Math" panose="02040503050406030204" pitchFamily="18" charset="0"/>
+                          </a:rPr>
+                          <m:t>[</m:t>
+                        </m:r>
+                        <m:r>
+                          <a:rPr lang="en-US" i="1">
+                            <a:latin typeface="Cambria Math" panose="02040503050406030204" pitchFamily="18" charset="0"/>
+                          </a:rPr>
+                          <m:t>2</m:t>
+                        </m:r>
+                        <m:r>
+                          <a:rPr lang="en-US" i="1">
+                            <a:latin typeface="Cambria Math" panose="02040503050406030204" pitchFamily="18" charset="0"/>
+                          </a:rPr>
+                          <m:t>]</m:t>
+                        </m:r>
+                      </m:sup>
+                    </m:sSup>
+                    <m:r>
+                      <a:rPr lang="en-US" b="0" i="0" smtClean="0">
+                        <a:latin typeface="Cambria Math" panose="02040503050406030204" pitchFamily="18" charset="0"/>
+                      </a:rPr>
+                      <m:t>→</m:t>
+                    </m:r>
+                    <m:sSup>
+                      <m:sSupPr>
+                        <m:ctrlPr>
+                          <a:rPr lang="en-US" i="1">
+                            <a:latin typeface="Cambria Math" panose="02040503050406030204" pitchFamily="18" charset="0"/>
+                          </a:rPr>
+                        </m:ctrlPr>
+                      </m:sSupPr>
+                      <m:e>
+                        <m:r>
+                          <a:rPr lang="en-US" i="1">
+                            <a:latin typeface="Cambria Math" panose="02040503050406030204" pitchFamily="18" charset="0"/>
+                          </a:rPr>
+                          <m:t>𝑧</m:t>
+                        </m:r>
+                      </m:e>
+                      <m:sup>
+                        <m:r>
+                          <a:rPr lang="en-US" i="1">
+                            <a:latin typeface="Cambria Math" panose="02040503050406030204" pitchFamily="18" charset="0"/>
+                          </a:rPr>
+                          <m:t>[</m:t>
+                        </m:r>
+                        <m:r>
+                          <a:rPr lang="en-US" i="1">
+                            <a:latin typeface="Cambria Math" panose="02040503050406030204" pitchFamily="18" charset="0"/>
+                          </a:rPr>
+                          <m:t>2</m:t>
+                        </m:r>
+                        <m:r>
+                          <a:rPr lang="en-US" i="1">
+                            <a:latin typeface="Cambria Math" panose="02040503050406030204" pitchFamily="18" charset="0"/>
+                          </a:rPr>
+                          <m:t>]</m:t>
+                        </m:r>
+                      </m:sup>
+                    </m:sSup>
+                    <m:r>
+                      <a:rPr lang="en-US" i="1">
+                        <a:latin typeface="Cambria Math" panose="02040503050406030204" pitchFamily="18" charset="0"/>
+                      </a:rPr>
+                      <m:t>=</m:t>
+                    </m:r>
+                    <m:sSup>
+                      <m:sSupPr>
+                        <m:ctrlPr>
+                          <a:rPr lang="en-US" i="1">
+                            <a:latin typeface="Cambria Math" panose="02040503050406030204" pitchFamily="18" charset="0"/>
+                          </a:rPr>
+                        </m:ctrlPr>
+                      </m:sSupPr>
+                      <m:e>
+                        <m:r>
+                          <a:rPr lang="en-US" b="1" i="1">
+                            <a:latin typeface="Cambria Math" panose="02040503050406030204" pitchFamily="18" charset="0"/>
+                          </a:rPr>
+                          <m:t>𝒘</m:t>
+                        </m:r>
+                      </m:e>
+                      <m:sup>
+                        <m:r>
+                          <a:rPr lang="en-US" i="1">
+                            <a:latin typeface="Cambria Math" panose="02040503050406030204" pitchFamily="18" charset="0"/>
+                          </a:rPr>
+                          <m:t>[</m:t>
+                        </m:r>
+                        <m:r>
+                          <a:rPr lang="en-US" i="1">
+                            <a:latin typeface="Cambria Math" panose="02040503050406030204" pitchFamily="18" charset="0"/>
+                          </a:rPr>
+                          <m:t>2</m:t>
+                        </m:r>
+                        <m:r>
+                          <a:rPr lang="en-US" i="1">
+                            <a:latin typeface="Cambria Math" panose="02040503050406030204" pitchFamily="18" charset="0"/>
+                          </a:rPr>
+                          <m:t>]</m:t>
+                        </m:r>
+                      </m:sup>
+                    </m:sSup>
+                    <m:r>
+                      <a:rPr lang="en-US" b="0" i="1" smtClean="0">
+                        <a:latin typeface="Cambria Math" panose="02040503050406030204" pitchFamily="18" charset="0"/>
+                      </a:rPr>
+                      <m:t>(</m:t>
+                    </m:r>
+                    <m:sSup>
+                      <m:sSupPr>
+                        <m:ctrlPr>
+                          <a:rPr lang="en-US" i="1">
+                            <a:latin typeface="Cambria Math" panose="02040503050406030204" pitchFamily="18" charset="0"/>
+                          </a:rPr>
+                        </m:ctrlPr>
+                      </m:sSupPr>
+                      <m:e>
+                        <m:r>
+                          <a:rPr lang="en-US" b="1" i="1">
+                            <a:latin typeface="Cambria Math" panose="02040503050406030204" pitchFamily="18" charset="0"/>
+                          </a:rPr>
+                          <m:t>𝒘</m:t>
+                        </m:r>
+                      </m:e>
+                      <m:sup>
+                        <m:r>
+                          <a:rPr lang="en-US" i="1">
+                            <a:latin typeface="Cambria Math" panose="02040503050406030204" pitchFamily="18" charset="0"/>
+                          </a:rPr>
+                          <m:t>[1]</m:t>
+                        </m:r>
+                      </m:sup>
+                    </m:sSup>
+                    <m:r>
+                      <m:rPr>
+                        <m:nor/>
+                      </m:rPr>
+                      <a:rPr lang="en-US" b="1" dirty="0">
+                        <a:ea typeface="Cambria Math" panose="02040503050406030204" pitchFamily="18" charset="0"/>
+                      </a:rPr>
+                      <m:t> </m:t>
+                    </m:r>
+                    <m:r>
+                      <a:rPr lang="en-US" b="1" i="1">
+                        <a:latin typeface="Cambria Math" panose="02040503050406030204" pitchFamily="18" charset="0"/>
+                        <a:ea typeface="Cambria Math" panose="02040503050406030204" pitchFamily="18" charset="0"/>
+                      </a:rPr>
+                      <m:t>𝒙</m:t>
+                    </m:r>
+                    <m:r>
+                      <a:rPr lang="en-US" b="1" i="1">
+                        <a:latin typeface="Cambria Math" panose="02040503050406030204" pitchFamily="18" charset="0"/>
+                        <a:ea typeface="Cambria Math" panose="02040503050406030204" pitchFamily="18" charset="0"/>
+                      </a:rPr>
+                      <m:t> </m:t>
+                    </m:r>
+                    <m:r>
+                      <m:rPr>
+                        <m:nor/>
+                      </m:rPr>
+                      <a:rPr lang="en-US" dirty="0"/>
+                      <m:t>+</m:t>
+                    </m:r>
+                    <m:sSup>
+                      <m:sSupPr>
+                        <m:ctrlPr>
+                          <a:rPr lang="en-US" i="1">
+                            <a:latin typeface="Cambria Math" panose="02040503050406030204" pitchFamily="18" charset="0"/>
+                          </a:rPr>
+                        </m:ctrlPr>
+                      </m:sSupPr>
+                      <m:e>
+                        <m:r>
+                          <a:rPr lang="en-US" b="1" i="1">
+                            <a:latin typeface="Cambria Math" panose="02040503050406030204" pitchFamily="18" charset="0"/>
+                          </a:rPr>
+                          <m:t>𝒃</m:t>
+                        </m:r>
+                      </m:e>
+                      <m:sup>
+                        <m:r>
+                          <a:rPr lang="en-US" i="1">
+                            <a:latin typeface="Cambria Math" panose="02040503050406030204" pitchFamily="18" charset="0"/>
+                          </a:rPr>
+                          <m:t>[1]</m:t>
+                        </m:r>
+                      </m:sup>
+                    </m:sSup>
+                    <m:r>
+                      <a:rPr lang="en-US" b="0" i="1" smtClean="0">
+                        <a:latin typeface="Cambria Math" panose="02040503050406030204" pitchFamily="18" charset="0"/>
+                      </a:rPr>
+                      <m:t>)</m:t>
+                    </m:r>
+                    <m:r>
+                      <m:rPr>
+                        <m:nor/>
+                      </m:rPr>
+                      <a:rPr lang="en-US" dirty="0"/>
+                      <m:t>+</m:t>
+                    </m:r>
+                    <m:sSup>
+                      <m:sSupPr>
+                        <m:ctrlPr>
+                          <a:rPr lang="en-US" i="1">
+                            <a:latin typeface="Cambria Math" panose="02040503050406030204" pitchFamily="18" charset="0"/>
+                          </a:rPr>
+                        </m:ctrlPr>
+                      </m:sSupPr>
+                      <m:e>
+                        <m:r>
+                          <a:rPr lang="en-US" i="1">
+                            <a:latin typeface="Cambria Math" panose="02040503050406030204" pitchFamily="18" charset="0"/>
+                          </a:rPr>
+                          <m:t>𝑏</m:t>
+                        </m:r>
+                      </m:e>
+                      <m:sup>
+                        <m:r>
+                          <a:rPr lang="en-US" i="1">
+                            <a:latin typeface="Cambria Math" panose="02040503050406030204" pitchFamily="18" charset="0"/>
+                          </a:rPr>
+                          <m:t>[</m:t>
+                        </m:r>
+                        <m:r>
+                          <a:rPr lang="en-US" i="1">
+                            <a:latin typeface="Cambria Math" panose="02040503050406030204" pitchFamily="18" charset="0"/>
+                          </a:rPr>
+                          <m:t>2</m:t>
+                        </m:r>
+                        <m:r>
+                          <a:rPr lang="en-US" i="1">
+                            <a:latin typeface="Cambria Math" panose="02040503050406030204" pitchFamily="18" charset="0"/>
+                          </a:rPr>
+                          <m:t>]</m:t>
+                        </m:r>
+                      </m:sup>
+                    </m:sSup>
+                  </m:oMath>
+                </a14:m>
+                <a:r>
+                  <a:rPr lang="en-US" dirty="0" smtClean="0"/>
+                  <a:t>    </a:t>
+                </a:r>
+              </a:p>
+              <a:p>
+                <a:pPr marL="0" indent="0">
+                  <a:buNone/>
+                </a:pPr>
+                <a:r>
+                  <a:rPr lang="en-US" dirty="0" smtClean="0"/>
+                  <a:t>                                                            </a:t>
+                </a:r>
+                <a14:m>
+                  <m:oMath xmlns:m="http://schemas.openxmlformats.org/officeDocument/2006/math">
+                    <m:r>
+                      <a:rPr lang="en-US">
+                        <a:latin typeface="Cambria Math" panose="02040503050406030204" pitchFamily="18" charset="0"/>
+                      </a:rPr>
+                      <m:t>→</m:t>
+                    </m:r>
+                    <m:sSup>
+                      <m:sSupPr>
+                        <m:ctrlPr>
+                          <a:rPr lang="en-US" i="1">
+                            <a:latin typeface="Cambria Math" panose="02040503050406030204" pitchFamily="18" charset="0"/>
+                          </a:rPr>
+                        </m:ctrlPr>
+                      </m:sSupPr>
+                      <m:e>
+                        <m:r>
+                          <a:rPr lang="en-US" i="1">
+                            <a:latin typeface="Cambria Math" panose="02040503050406030204" pitchFamily="18" charset="0"/>
+                          </a:rPr>
+                          <m:t>𝑧</m:t>
+                        </m:r>
+                      </m:e>
+                      <m:sup>
+                        <m:r>
+                          <a:rPr lang="en-US" i="1">
+                            <a:latin typeface="Cambria Math" panose="02040503050406030204" pitchFamily="18" charset="0"/>
+                          </a:rPr>
+                          <m:t>[2]</m:t>
+                        </m:r>
+                      </m:sup>
+                    </m:sSup>
+                    <m:r>
+                      <a:rPr lang="en-US" i="1">
+                        <a:latin typeface="Cambria Math" panose="02040503050406030204" pitchFamily="18" charset="0"/>
+                      </a:rPr>
+                      <m:t>=</m:t>
+                    </m:r>
+                    <m:sSup>
+                      <m:sSupPr>
+                        <m:ctrlPr>
+                          <a:rPr lang="en-US" i="1">
+                            <a:latin typeface="Cambria Math" panose="02040503050406030204" pitchFamily="18" charset="0"/>
+                          </a:rPr>
+                        </m:ctrlPr>
+                      </m:sSupPr>
+                      <m:e>
+                        <m:r>
+                          <a:rPr lang="en-US" b="1" i="1">
+                            <a:latin typeface="Cambria Math" panose="02040503050406030204" pitchFamily="18" charset="0"/>
+                          </a:rPr>
+                          <m:t>𝒘</m:t>
+                        </m:r>
+                      </m:e>
+                      <m:sup>
+                        <m:r>
+                          <a:rPr lang="en-US" i="1">
+                            <a:latin typeface="Cambria Math" panose="02040503050406030204" pitchFamily="18" charset="0"/>
+                          </a:rPr>
+                          <m:t>[2]</m:t>
+                        </m:r>
+                      </m:sup>
+                    </m:sSup>
+                    <m:sSup>
+                      <m:sSupPr>
+                        <m:ctrlPr>
+                          <a:rPr lang="en-US" i="1">
+                            <a:latin typeface="Cambria Math" panose="02040503050406030204" pitchFamily="18" charset="0"/>
+                          </a:rPr>
+                        </m:ctrlPr>
+                      </m:sSupPr>
+                      <m:e>
+                        <m:r>
+                          <a:rPr lang="en-US" b="1" i="1">
+                            <a:latin typeface="Cambria Math" panose="02040503050406030204" pitchFamily="18" charset="0"/>
+                          </a:rPr>
+                          <m:t>𝒘</m:t>
+                        </m:r>
+                      </m:e>
+                      <m:sup>
+                        <m:r>
+                          <a:rPr lang="en-US" i="1">
+                            <a:latin typeface="Cambria Math" panose="02040503050406030204" pitchFamily="18" charset="0"/>
+                          </a:rPr>
+                          <m:t>[1]</m:t>
+                        </m:r>
+                      </m:sup>
+                    </m:sSup>
+                    <m:r>
+                      <m:rPr>
+                        <m:nor/>
+                      </m:rPr>
+                      <a:rPr lang="en-US" b="1" dirty="0">
+                        <a:ea typeface="Cambria Math" panose="02040503050406030204" pitchFamily="18" charset="0"/>
+                      </a:rPr>
+                      <m:t> </m:t>
+                    </m:r>
+                    <m:r>
+                      <a:rPr lang="en-US" b="1" i="1">
+                        <a:latin typeface="Cambria Math" panose="02040503050406030204" pitchFamily="18" charset="0"/>
+                        <a:ea typeface="Cambria Math" panose="02040503050406030204" pitchFamily="18" charset="0"/>
+                      </a:rPr>
+                      <m:t>𝒙</m:t>
+                    </m:r>
+                    <m:r>
+                      <a:rPr lang="en-US" b="1" i="1">
+                        <a:latin typeface="Cambria Math" panose="02040503050406030204" pitchFamily="18" charset="0"/>
+                        <a:ea typeface="Cambria Math" panose="02040503050406030204" pitchFamily="18" charset="0"/>
+                      </a:rPr>
+                      <m:t> </m:t>
+                    </m:r>
+                    <m:r>
+                      <m:rPr>
+                        <m:nor/>
+                      </m:rPr>
+                      <a:rPr lang="en-US" dirty="0"/>
+                      <m:t>+</m:t>
+                    </m:r>
+                    <m:r>
+                      <m:rPr>
+                        <m:nor/>
+                      </m:rPr>
+                      <a:rPr lang="en-US" b="0" i="0" dirty="0" smtClean="0"/>
+                      <m:t> </m:t>
+                    </m:r>
+                    <m:sSup>
+                      <m:sSupPr>
+                        <m:ctrlPr>
+                          <a:rPr lang="en-US" i="1">
+                            <a:latin typeface="Cambria Math" panose="02040503050406030204" pitchFamily="18" charset="0"/>
+                          </a:rPr>
+                        </m:ctrlPr>
+                      </m:sSupPr>
+                      <m:e>
+                        <m:r>
+                          <a:rPr lang="en-US" b="1" i="1">
+                            <a:latin typeface="Cambria Math" panose="02040503050406030204" pitchFamily="18" charset="0"/>
+                          </a:rPr>
+                          <m:t>𝒘</m:t>
+                        </m:r>
+                      </m:e>
+                      <m:sup>
+                        <m:r>
+                          <a:rPr lang="en-US" i="1">
+                            <a:latin typeface="Cambria Math" panose="02040503050406030204" pitchFamily="18" charset="0"/>
+                          </a:rPr>
+                          <m:t>[2]</m:t>
+                        </m:r>
+                      </m:sup>
+                    </m:sSup>
+                    <m:sSup>
+                      <m:sSupPr>
+                        <m:ctrlPr>
+                          <a:rPr lang="en-US" i="1">
+                            <a:latin typeface="Cambria Math" panose="02040503050406030204" pitchFamily="18" charset="0"/>
+                          </a:rPr>
+                        </m:ctrlPr>
+                      </m:sSupPr>
+                      <m:e>
+                        <m:r>
+                          <a:rPr lang="en-US" b="1" i="1">
+                            <a:latin typeface="Cambria Math" panose="02040503050406030204" pitchFamily="18" charset="0"/>
+                          </a:rPr>
+                          <m:t>𝒃</m:t>
+                        </m:r>
+                      </m:e>
+                      <m:sup>
+                        <m:r>
+                          <a:rPr lang="en-US" i="1">
+                            <a:latin typeface="Cambria Math" panose="02040503050406030204" pitchFamily="18" charset="0"/>
+                          </a:rPr>
+                          <m:t>[1]</m:t>
+                        </m:r>
+                      </m:sup>
+                    </m:sSup>
+                    <m:r>
+                      <m:rPr>
+                        <m:nor/>
+                      </m:rPr>
+                      <a:rPr lang="en-US" dirty="0"/>
+                      <m:t>+</m:t>
+                    </m:r>
+                    <m:sSup>
+                      <m:sSupPr>
+                        <m:ctrlPr>
+                          <a:rPr lang="en-US" i="1">
+                            <a:latin typeface="Cambria Math" panose="02040503050406030204" pitchFamily="18" charset="0"/>
+                          </a:rPr>
+                        </m:ctrlPr>
+                      </m:sSupPr>
+                      <m:e>
+                        <m:r>
+                          <a:rPr lang="en-US" i="1">
+                            <a:latin typeface="Cambria Math" panose="02040503050406030204" pitchFamily="18" charset="0"/>
+                          </a:rPr>
+                          <m:t>𝑏</m:t>
+                        </m:r>
+                      </m:e>
+                      <m:sup>
+                        <m:r>
+                          <a:rPr lang="en-US" i="1">
+                            <a:latin typeface="Cambria Math" panose="02040503050406030204" pitchFamily="18" charset="0"/>
+                          </a:rPr>
+                          <m:t>[2]</m:t>
+                        </m:r>
+                      </m:sup>
+                    </m:sSup>
+                  </m:oMath>
+                </a14:m>
+                <a:endParaRPr lang="en-US" dirty="0"/>
+              </a:p>
+            </p:txBody>
+          </p:sp>
+        </mc:Choice>
+        <mc:Fallback>
+          <p:sp>
+            <p:nvSpPr>
+              <p:cNvPr id="3" name="Content Placeholder 2"/>
+              <p:cNvSpPr>
+                <a:spLocks noGrp="1" noRot="1" noChangeAspect="1" noMove="1" noResize="1" noEditPoints="1" noAdjustHandles="1" noChangeArrowheads="1" noChangeShapeType="1" noTextEdit="1"/>
+              </p:cNvSpPr>
+              <p:nvPr>
+                <p:ph idx="1"/>
+              </p:nvPr>
+            </p:nvSpPr>
+            <p:spPr>
+              <a:blipFill rotWithShape="0">
+                <a:blip r:embed="rId2"/>
+                <a:stretch>
+                  <a:fillRect l="-930" t="-562"/>
+                </a:stretch>
+              </a:blipFill>
+            </p:spPr>
+            <p:txBody>
+              <a:bodyPr/>
+              <a:lstStyle/>
+              <a:p>
+                <a:r>
+                  <a:rPr lang="en-US">
+                    <a:noFill/>
+                  </a:rPr>
+                  <a:t> </a:t>
+                </a:r>
+              </a:p>
+            </p:txBody>
+          </p:sp>
+        </mc:Fallback>
+      </mc:AlternateContent>
+      <p:sp>
+        <p:nvSpPr>
+          <p:cNvPr id="4" name="Slide Number Placeholder 3"/>
+          <p:cNvSpPr>
+            <a:spLocks noGrp="1"/>
+          </p:cNvSpPr>
+          <p:nvPr>
+            <p:ph type="sldNum" sz="quarter" idx="10"/>
+          </p:nvPr>
+        </p:nvSpPr>
+        <p:spPr/>
+        <p:txBody>
+          <a:bodyPr/>
+          <a:lstStyle/>
+          <a:p>
+            <a:fld id="{6376B962-9A28-45C6-BBAD-D5665CAF4927}" type="slidenum">
+              <a:rPr lang="ko-KR" altLang="en-US" smtClean="0"/>
+              <a:t>7</a:t>
+            </a:fld>
+            <a:endParaRPr lang="ko-KR" altLang="en-US"/>
+          </a:p>
+        </p:txBody>
+      </p:sp>
+      <p:sp>
+        <p:nvSpPr>
+          <p:cNvPr id="5" name="Right Brace 4"/>
+          <p:cNvSpPr/>
+          <p:nvPr/>
+        </p:nvSpPr>
+        <p:spPr bwMode="auto">
+          <a:xfrm rot="5400000">
+            <a:off x="5560388" y="2264189"/>
+            <a:ext cx="302040" cy="603734"/>
+          </a:xfrm>
+          <a:prstGeom prst="rightBrace">
+            <a:avLst/>
+          </a:prstGeom>
+          <a:ln>
+            <a:headEnd type="none" w="med" len="med"/>
+            <a:tailEnd type="none" w="med" len="med"/>
+          </a:ln>
+        </p:spPr>
+        <p:style>
+          <a:lnRef idx="2">
+            <a:schemeClr val="accent4"/>
+          </a:lnRef>
+          <a:fillRef idx="0">
+            <a:schemeClr val="accent4"/>
+          </a:fillRef>
+          <a:effectRef idx="1">
+            <a:schemeClr val="accent4"/>
+          </a:effectRef>
+          <a:fontRef idx="minor">
+            <a:schemeClr val="tx1"/>
+          </a:fontRef>
+        </p:style>
+        <p:txBody>
+          <a:bodyPr vert="horz" wrap="square" lIns="91440" tIns="45720" rIns="91440" bIns="45720" numCol="1" rtlCol="0" anchor="t" anchorCtr="0" compatLnSpc="1">
+            <a:prstTxWarp prst="textNoShape">
+              <a:avLst/>
+            </a:prstTxWarp>
+          </a:bodyPr>
+          <a:lstStyle/>
+          <a:p>
+            <a:pPr marL="457200" marR="0" indent="-457200" algn="ctr" defTabSz="914400" rtl="0" eaLnBrk="1" fontAlgn="base" latinLnBrk="0" hangingPunct="1">
+              <a:lnSpc>
+                <a:spcPct val="80000"/>
+              </a:lnSpc>
+              <a:spcBef>
+                <a:spcPct val="20000"/>
+              </a:spcBef>
+              <a:spcAft>
+                <a:spcPct val="0"/>
+              </a:spcAft>
+              <a:buClr>
+                <a:schemeClr val="folHlink"/>
+              </a:buClr>
+              <a:buSzPct val="90000"/>
+              <a:buFont typeface="Wingdings 2" pitchFamily="18" charset="2"/>
+              <a:buAutoNum type="arabicParenR"/>
+              <a:tabLst/>
+            </a:pPr>
+            <a:endParaRPr kumimoji="1" lang="en-US" sz="1400" b="1" i="0" u="none" strike="noStrike" cap="none" normalizeH="0" baseline="0" smtClean="0">
+              <a:ln>
+                <a:noFill/>
+              </a:ln>
+              <a:solidFill>
+                <a:schemeClr val="folHlink"/>
+              </a:solidFill>
+              <a:effectLst/>
+              <a:latin typeface="Verdana" pitchFamily="34" charset="0"/>
+              <a:ea typeface="HY견고딕" pitchFamily="18" charset="-127"/>
+            </a:endParaRPr>
+          </a:p>
+        </p:txBody>
+      </p:sp>
+      <p:sp>
+        <p:nvSpPr>
+          <p:cNvPr id="6" name="Right Brace 5"/>
+          <p:cNvSpPr/>
+          <p:nvPr/>
+        </p:nvSpPr>
+        <p:spPr bwMode="auto">
+          <a:xfrm rot="5400000">
+            <a:off x="7379841" y="1893196"/>
+            <a:ext cx="302040" cy="1345720"/>
+          </a:xfrm>
+          <a:prstGeom prst="rightBrace">
+            <a:avLst/>
+          </a:prstGeom>
+          <a:ln>
+            <a:headEnd type="none" w="med" len="med"/>
+            <a:tailEnd type="none" w="med" len="med"/>
+          </a:ln>
+        </p:spPr>
+        <p:style>
+          <a:lnRef idx="2">
+            <a:schemeClr val="accent4"/>
+          </a:lnRef>
+          <a:fillRef idx="0">
+            <a:schemeClr val="accent4"/>
+          </a:fillRef>
+          <a:effectRef idx="1">
+            <a:schemeClr val="accent4"/>
+          </a:effectRef>
+          <a:fontRef idx="minor">
+            <a:schemeClr val="tx1"/>
+          </a:fontRef>
+        </p:style>
+        <p:txBody>
+          <a:bodyPr vert="horz" wrap="square" lIns="91440" tIns="45720" rIns="91440" bIns="45720" numCol="1" rtlCol="0" anchor="t" anchorCtr="0" compatLnSpc="1">
+            <a:prstTxWarp prst="textNoShape">
+              <a:avLst/>
+            </a:prstTxWarp>
+          </a:bodyPr>
+          <a:lstStyle/>
+          <a:p>
+            <a:pPr marL="457200" marR="0" indent="-457200" algn="ctr" defTabSz="914400" rtl="0" eaLnBrk="1" fontAlgn="base" latinLnBrk="0" hangingPunct="1">
+              <a:lnSpc>
+                <a:spcPct val="80000"/>
+              </a:lnSpc>
+              <a:spcBef>
+                <a:spcPct val="20000"/>
+              </a:spcBef>
+              <a:spcAft>
+                <a:spcPct val="0"/>
+              </a:spcAft>
+              <a:buClr>
+                <a:schemeClr val="folHlink"/>
+              </a:buClr>
+              <a:buSzPct val="90000"/>
+              <a:buFont typeface="Wingdings 2" pitchFamily="18" charset="2"/>
+              <a:buAutoNum type="arabicParenR"/>
+              <a:tabLst/>
+            </a:pPr>
+            <a:endParaRPr kumimoji="1" lang="en-US" sz="1400" b="1" i="0" u="none" strike="noStrike" cap="none" normalizeH="0" baseline="0" smtClean="0">
+              <a:ln>
+                <a:noFill/>
+              </a:ln>
+              <a:solidFill>
+                <a:schemeClr val="folHlink"/>
+              </a:solidFill>
+              <a:effectLst/>
+              <a:latin typeface="Verdana" pitchFamily="34" charset="0"/>
+              <a:ea typeface="HY견고딕" pitchFamily="18" charset="-127"/>
+            </a:endParaRPr>
+          </a:p>
+        </p:txBody>
+      </p:sp>
+      <mc:AlternateContent xmlns:mc="http://schemas.openxmlformats.org/markup-compatibility/2006">
+        <mc:Choice xmlns:a14="http://schemas.microsoft.com/office/drawing/2010/main" Requires="a14">
+          <p:sp>
+            <p:nvSpPr>
+              <p:cNvPr id="7" name="TextBox 6"/>
+              <p:cNvSpPr txBox="1"/>
+              <p:nvPr/>
+            </p:nvSpPr>
+            <p:spPr>
+              <a:xfrm>
+                <a:off x="5461184" y="2717076"/>
+                <a:ext cx="552091" cy="369332"/>
+              </a:xfrm>
+              <a:prstGeom prst="rect">
+                <a:avLst/>
+              </a:prstGeom>
+              <a:noFill/>
+            </p:spPr>
+            <p:txBody>
+              <a:bodyPr wrap="square" rtlCol="0">
+                <a:spAutoFit/>
+              </a:bodyPr>
+              <a:lstStyle/>
+              <a:p>
+                <a14:m>
+                  <m:oMathPara xmlns:m="http://schemas.openxmlformats.org/officeDocument/2006/math">
+                    <m:oMathParaPr>
+                      <m:jc m:val="centerGroup"/>
+                    </m:oMathParaPr>
+                    <m:oMath xmlns:m="http://schemas.openxmlformats.org/officeDocument/2006/math">
+                      <m:sSup>
+                        <m:sSupPr>
+                          <m:ctrlPr>
+                            <a:rPr lang="en-US" i="1" smtClean="0">
+                              <a:latin typeface="Cambria Math" panose="02040503050406030204" pitchFamily="18" charset="0"/>
+                            </a:rPr>
+                          </m:ctrlPr>
+                        </m:sSupPr>
+                        <m:e>
+                          <m:r>
+                            <a:rPr lang="en-US" b="1" i="1">
+                              <a:latin typeface="Cambria Math" panose="02040503050406030204" pitchFamily="18" charset="0"/>
+                            </a:rPr>
+                            <m:t>𝒘</m:t>
+                          </m:r>
+                        </m:e>
+                        <m:sup>
+                          <m:r>
+                            <a:rPr lang="en-US" b="0" i="1" smtClean="0">
+                              <a:latin typeface="Cambria Math" panose="02040503050406030204" pitchFamily="18" charset="0"/>
+                            </a:rPr>
+                            <m:t>′</m:t>
+                          </m:r>
+                        </m:sup>
+                      </m:sSup>
+                    </m:oMath>
+                  </m:oMathPara>
+                </a14:m>
+                <a:endParaRPr lang="en-US" dirty="0"/>
+              </a:p>
+            </p:txBody>
+          </p:sp>
+        </mc:Choice>
+        <mc:Fallback>
+          <p:sp>
+            <p:nvSpPr>
+              <p:cNvPr id="7" name="TextBox 6"/>
+              <p:cNvSpPr txBox="1">
+                <a:spLocks noRot="1" noChangeAspect="1" noMove="1" noResize="1" noEditPoints="1" noAdjustHandles="1" noChangeArrowheads="1" noChangeShapeType="1" noTextEdit="1"/>
+              </p:cNvSpPr>
+              <p:nvPr/>
+            </p:nvSpPr>
+            <p:spPr>
+              <a:xfrm>
+                <a:off x="5461184" y="2717076"/>
+                <a:ext cx="552091" cy="369332"/>
+              </a:xfrm>
+              <a:prstGeom prst="rect">
+                <a:avLst/>
+              </a:prstGeom>
+              <a:blipFill rotWithShape="0">
+                <a:blip r:embed="rId3"/>
+                <a:stretch>
+                  <a:fillRect/>
+                </a:stretch>
+              </a:blipFill>
+            </p:spPr>
+            <p:txBody>
+              <a:bodyPr/>
+              <a:lstStyle/>
+              <a:p>
+                <a:r>
+                  <a:rPr lang="en-US">
+                    <a:noFill/>
+                  </a:rPr>
+                  <a:t> </a:t>
+                </a:r>
+              </a:p>
+            </p:txBody>
+          </p:sp>
+        </mc:Fallback>
+      </mc:AlternateContent>
+      <mc:AlternateContent xmlns:mc="http://schemas.openxmlformats.org/markup-compatibility/2006">
+        <mc:Choice xmlns:a14="http://schemas.microsoft.com/office/drawing/2010/main" Requires="a14">
+          <p:sp>
+            <p:nvSpPr>
+              <p:cNvPr id="8" name="TextBox 7"/>
+              <p:cNvSpPr txBox="1"/>
+              <p:nvPr/>
+            </p:nvSpPr>
+            <p:spPr>
+              <a:xfrm>
+                <a:off x="7254815" y="2741041"/>
+                <a:ext cx="552091" cy="369332"/>
+              </a:xfrm>
+              <a:prstGeom prst="rect">
+                <a:avLst/>
+              </a:prstGeom>
+              <a:noFill/>
+            </p:spPr>
+            <p:txBody>
+              <a:bodyPr wrap="square" rtlCol="0">
+                <a:spAutoFit/>
+              </a:bodyPr>
+              <a:lstStyle/>
+              <a:p>
+                <a14:m>
+                  <m:oMathPara xmlns:m="http://schemas.openxmlformats.org/officeDocument/2006/math">
+                    <m:oMathParaPr>
+                      <m:jc m:val="centerGroup"/>
+                    </m:oMathParaPr>
+                    <m:oMath xmlns:m="http://schemas.openxmlformats.org/officeDocument/2006/math">
+                      <m:sSup>
+                        <m:sSupPr>
+                          <m:ctrlPr>
+                            <a:rPr lang="en-US" i="1" smtClean="0">
+                              <a:latin typeface="Cambria Math" panose="02040503050406030204" pitchFamily="18" charset="0"/>
+                            </a:rPr>
+                          </m:ctrlPr>
+                        </m:sSupPr>
+                        <m:e>
+                          <m:r>
+                            <a:rPr lang="en-US" b="1" i="1" smtClean="0">
+                              <a:latin typeface="Cambria Math" panose="02040503050406030204" pitchFamily="18" charset="0"/>
+                            </a:rPr>
+                            <m:t>𝒃</m:t>
+                          </m:r>
+                        </m:e>
+                        <m:sup>
+                          <m:r>
+                            <a:rPr lang="en-US" b="0" i="1" smtClean="0">
+                              <a:latin typeface="Cambria Math" panose="02040503050406030204" pitchFamily="18" charset="0"/>
+                            </a:rPr>
+                            <m:t>′</m:t>
+                          </m:r>
+                        </m:sup>
+                      </m:sSup>
+                    </m:oMath>
+                  </m:oMathPara>
+                </a14:m>
+                <a:endParaRPr lang="en-US" dirty="0"/>
+              </a:p>
+            </p:txBody>
+          </p:sp>
+        </mc:Choice>
+        <mc:Fallback>
+          <p:sp>
+            <p:nvSpPr>
+              <p:cNvPr id="8" name="TextBox 7"/>
+              <p:cNvSpPr txBox="1">
+                <a:spLocks noRot="1" noChangeAspect="1" noMove="1" noResize="1" noEditPoints="1" noAdjustHandles="1" noChangeArrowheads="1" noChangeShapeType="1" noTextEdit="1"/>
+              </p:cNvSpPr>
+              <p:nvPr/>
+            </p:nvSpPr>
+            <p:spPr>
+              <a:xfrm>
+                <a:off x="7254815" y="2741041"/>
+                <a:ext cx="552091" cy="369332"/>
+              </a:xfrm>
+              <a:prstGeom prst="rect">
+                <a:avLst/>
+              </a:prstGeom>
+              <a:blipFill rotWithShape="0">
+                <a:blip r:embed="rId4"/>
+                <a:stretch>
+                  <a:fillRect/>
+                </a:stretch>
+              </a:blipFill>
+            </p:spPr>
+            <p:txBody>
+              <a:bodyPr/>
+              <a:lstStyle/>
+              <a:p>
+                <a:r>
+                  <a:rPr lang="en-US">
+                    <a:noFill/>
+                  </a:rPr>
+                  <a:t> </a:t>
+                </a:r>
+              </a:p>
+            </p:txBody>
+          </p:sp>
+        </mc:Fallback>
+      </mc:AlternateContent>
+      <mc:AlternateContent xmlns:mc="http://schemas.openxmlformats.org/markup-compatibility/2006">
+        <mc:Choice xmlns:a14="http://schemas.microsoft.com/office/drawing/2010/main" Requires="a14">
+          <p:sp>
+            <p:nvSpPr>
+              <p:cNvPr id="9" name="TextBox 8"/>
+              <p:cNvSpPr txBox="1"/>
+              <p:nvPr/>
+            </p:nvSpPr>
+            <p:spPr>
+              <a:xfrm>
+                <a:off x="1725284" y="3479705"/>
+                <a:ext cx="6650966" cy="1153329"/>
+              </a:xfrm>
+              <a:prstGeom prst="rect">
+                <a:avLst/>
+              </a:prstGeom>
+            </p:spPr>
+            <p:style>
+              <a:lnRef idx="1">
+                <a:schemeClr val="accent4"/>
+              </a:lnRef>
+              <a:fillRef idx="2">
+                <a:schemeClr val="accent4"/>
+              </a:fillRef>
+              <a:effectRef idx="1">
+                <a:schemeClr val="accent4"/>
+              </a:effectRef>
+              <a:fontRef idx="minor">
+                <a:schemeClr val="dk1"/>
+              </a:fontRef>
+            </p:style>
+            <p:txBody>
+              <a:bodyPr wrap="square" rtlCol="0">
+                <a:spAutoFit/>
+              </a:bodyPr>
+              <a:lstStyle/>
+              <a:p>
+                <a:endParaRPr lang="en-US" sz="2200" i="1" dirty="0" smtClean="0">
+                  <a:latin typeface="Cambria Math" panose="02040503050406030204" pitchFamily="18" charset="0"/>
+                </a:endParaRPr>
+              </a:p>
+              <a:p>
+                <a14:m>
+                  <m:oMathPara xmlns:m="http://schemas.openxmlformats.org/officeDocument/2006/math">
+                    <m:oMathParaPr>
+                      <m:jc m:val="centerGroup"/>
+                    </m:oMathParaPr>
+                    <m:oMath xmlns:m="http://schemas.openxmlformats.org/officeDocument/2006/math">
+                      <m:sSup>
+                        <m:sSupPr>
+                          <m:ctrlPr>
+                            <a:rPr lang="en-US" sz="2200" i="1" smtClean="0">
+                              <a:latin typeface="Cambria Math" panose="02040503050406030204" pitchFamily="18" charset="0"/>
+                            </a:rPr>
+                          </m:ctrlPr>
+                        </m:sSupPr>
+                        <m:e>
+                          <m:r>
+                            <a:rPr lang="en-US" sz="2200" b="0" i="1" smtClean="0">
+                              <a:latin typeface="Cambria Math" panose="02040503050406030204" pitchFamily="18" charset="0"/>
+                            </a:rPr>
+                            <m:t>→</m:t>
+                          </m:r>
+                          <m:r>
+                            <a:rPr lang="en-US" sz="2200" i="1">
+                              <a:latin typeface="Cambria Math" panose="02040503050406030204" pitchFamily="18" charset="0"/>
+                            </a:rPr>
+                            <m:t>𝑧</m:t>
+                          </m:r>
+                        </m:e>
+                        <m:sup>
+                          <m:r>
+                            <a:rPr lang="en-US" sz="2200" i="1">
+                              <a:latin typeface="Cambria Math" panose="02040503050406030204" pitchFamily="18" charset="0"/>
+                            </a:rPr>
+                            <m:t>[2]</m:t>
+                          </m:r>
+                        </m:sup>
+                      </m:sSup>
+                      <m:r>
+                        <a:rPr lang="en-US" sz="2200" i="1">
+                          <a:latin typeface="Cambria Math" panose="02040503050406030204" pitchFamily="18" charset="0"/>
+                        </a:rPr>
+                        <m:t>=</m:t>
+                      </m:r>
+                      <m:sSup>
+                        <m:sSupPr>
+                          <m:ctrlPr>
+                            <a:rPr lang="en-US" sz="2200" i="1">
+                              <a:latin typeface="Cambria Math" panose="02040503050406030204" pitchFamily="18" charset="0"/>
+                            </a:rPr>
+                          </m:ctrlPr>
+                        </m:sSupPr>
+                        <m:e>
+                          <m:r>
+                            <a:rPr lang="en-US" sz="2200" b="1" i="1">
+                              <a:latin typeface="Cambria Math" panose="02040503050406030204" pitchFamily="18" charset="0"/>
+                            </a:rPr>
+                            <m:t>𝒘</m:t>
+                          </m:r>
+                        </m:e>
+                        <m:sup>
+                          <m:r>
+                            <a:rPr lang="en-US" sz="2200" i="1">
+                              <a:latin typeface="Cambria Math" panose="02040503050406030204" pitchFamily="18" charset="0"/>
+                            </a:rPr>
+                            <m:t>′</m:t>
+                          </m:r>
+                        </m:sup>
+                      </m:sSup>
+                      <m:r>
+                        <a:rPr lang="en-US" sz="2200" b="1" i="1">
+                          <a:latin typeface="Cambria Math" panose="02040503050406030204" pitchFamily="18" charset="0"/>
+                          <a:ea typeface="Cambria Math" panose="02040503050406030204" pitchFamily="18" charset="0"/>
+                        </a:rPr>
+                        <m:t>𝒙</m:t>
+                      </m:r>
+                      <m:r>
+                        <a:rPr lang="en-US" sz="2200" b="1" i="1">
+                          <a:latin typeface="Cambria Math" panose="02040503050406030204" pitchFamily="18" charset="0"/>
+                          <a:ea typeface="Cambria Math" panose="02040503050406030204" pitchFamily="18" charset="0"/>
+                        </a:rPr>
+                        <m:t> </m:t>
+                      </m:r>
+                      <m:r>
+                        <m:rPr>
+                          <m:nor/>
+                        </m:rPr>
+                        <a:rPr lang="en-US" sz="2200" dirty="0"/>
+                        <m:t>+</m:t>
+                      </m:r>
+                      <m:sSup>
+                        <m:sSupPr>
+                          <m:ctrlPr>
+                            <a:rPr lang="en-US" sz="2200" i="1">
+                              <a:latin typeface="Cambria Math" panose="02040503050406030204" pitchFamily="18" charset="0"/>
+                            </a:rPr>
+                          </m:ctrlPr>
+                        </m:sSupPr>
+                        <m:e>
+                          <m:r>
+                            <a:rPr lang="en-US" sz="2200" b="1" i="1">
+                              <a:latin typeface="Cambria Math" panose="02040503050406030204" pitchFamily="18" charset="0"/>
+                            </a:rPr>
+                            <m:t>𝒃</m:t>
+                          </m:r>
+                        </m:e>
+                        <m:sup>
+                          <m:r>
+                            <a:rPr lang="en-US" sz="2200" i="1">
+                              <a:latin typeface="Cambria Math" panose="02040503050406030204" pitchFamily="18" charset="0"/>
+                            </a:rPr>
+                            <m:t>′</m:t>
+                          </m:r>
+                        </m:sup>
+                      </m:sSup>
+                      <m:r>
+                        <a:rPr lang="en-US" sz="2200" b="0" i="1" smtClean="0">
+                          <a:latin typeface="Cambria Math" panose="02040503050406030204" pitchFamily="18" charset="0"/>
+                        </a:rPr>
+                        <m:t>→</m:t>
+                      </m:r>
+                      <m:sSup>
+                        <m:sSupPr>
+                          <m:ctrlPr>
+                            <a:rPr lang="en-US" sz="2200" i="1">
+                              <a:latin typeface="Cambria Math" panose="02040503050406030204" pitchFamily="18" charset="0"/>
+                            </a:rPr>
+                          </m:ctrlPr>
+                        </m:sSupPr>
+                        <m:e>
+                          <m:r>
+                            <a:rPr lang="en-US" sz="2200" i="1">
+                              <a:latin typeface="Cambria Math" panose="02040503050406030204" pitchFamily="18" charset="0"/>
+                            </a:rPr>
+                            <m:t>𝑎</m:t>
+                          </m:r>
+                        </m:e>
+                        <m:sup>
+                          <m:r>
+                            <a:rPr lang="en-US" sz="2200" i="1">
+                              <a:latin typeface="Cambria Math" panose="02040503050406030204" pitchFamily="18" charset="0"/>
+                            </a:rPr>
+                            <m:t>[</m:t>
+                          </m:r>
+                          <m:r>
+                            <a:rPr lang="en-US" sz="2200" i="1">
+                              <a:latin typeface="Cambria Math" panose="02040503050406030204" pitchFamily="18" charset="0"/>
+                            </a:rPr>
+                            <m:t>2</m:t>
+                          </m:r>
+                          <m:r>
+                            <a:rPr lang="en-US" sz="2200" i="1">
+                              <a:latin typeface="Cambria Math" panose="02040503050406030204" pitchFamily="18" charset="0"/>
+                            </a:rPr>
+                            <m:t>]</m:t>
+                          </m:r>
+                        </m:sup>
+                      </m:sSup>
+                      <m:r>
+                        <a:rPr lang="en-US" sz="2200" i="1">
+                          <a:latin typeface="Cambria Math" panose="02040503050406030204" pitchFamily="18" charset="0"/>
+                        </a:rPr>
+                        <m:t>=</m:t>
+                      </m:r>
+                      <m:r>
+                        <m:rPr>
+                          <m:nor/>
+                        </m:rPr>
+                        <a:rPr lang="en-US" sz="2200" b="1" dirty="0"/>
+                        <m:t> </m:t>
+                      </m:r>
+                      <m:r>
+                        <a:rPr lang="en-US" sz="2200" b="1" i="1" dirty="0">
+                          <a:latin typeface="Cambria Math" panose="02040503050406030204" pitchFamily="18" charset="0"/>
+                        </a:rPr>
+                        <m:t>𝝈</m:t>
+                      </m:r>
+                      <m:r>
+                        <m:rPr>
+                          <m:nor/>
+                        </m:rPr>
+                        <a:rPr lang="en-US" sz="2200" dirty="0"/>
+                        <m:t>(</m:t>
+                      </m:r>
+                      <m:sSup>
+                        <m:sSupPr>
+                          <m:ctrlPr>
+                            <a:rPr lang="en-US" sz="2200" i="1">
+                              <a:latin typeface="Cambria Math" panose="02040503050406030204" pitchFamily="18" charset="0"/>
+                            </a:rPr>
+                          </m:ctrlPr>
+                        </m:sSupPr>
+                        <m:e>
+                          <m:r>
+                            <a:rPr lang="en-US" sz="2200" i="1">
+                              <a:latin typeface="Cambria Math" panose="02040503050406030204" pitchFamily="18" charset="0"/>
+                            </a:rPr>
+                            <m:t>𝑧</m:t>
+                          </m:r>
+                        </m:e>
+                        <m:sup>
+                          <m:r>
+                            <a:rPr lang="en-US" sz="2200" i="1">
+                              <a:latin typeface="Cambria Math" panose="02040503050406030204" pitchFamily="18" charset="0"/>
+                            </a:rPr>
+                            <m:t>[</m:t>
+                          </m:r>
+                          <m:r>
+                            <a:rPr lang="en-US" sz="2200" i="1">
+                              <a:latin typeface="Cambria Math" panose="02040503050406030204" pitchFamily="18" charset="0"/>
+                            </a:rPr>
+                            <m:t>2</m:t>
+                          </m:r>
+                          <m:r>
+                            <a:rPr lang="en-US" sz="2200" i="1">
+                              <a:latin typeface="Cambria Math" panose="02040503050406030204" pitchFamily="18" charset="0"/>
+                            </a:rPr>
+                            <m:t>]</m:t>
+                          </m:r>
+                        </m:sup>
+                      </m:sSup>
+                      <m:r>
+                        <m:rPr>
+                          <m:nor/>
+                        </m:rPr>
+                        <a:rPr lang="en-US" sz="2200" dirty="0"/>
+                        <m:t>)</m:t>
+                      </m:r>
+                      <m:r>
+                        <m:rPr>
+                          <m:nor/>
+                        </m:rPr>
+                        <a:rPr lang="en-US" sz="2200" b="0" i="0" dirty="0" smtClean="0"/>
+                        <m:t> </m:t>
+                      </m:r>
+                      <m:r>
+                        <m:rPr>
+                          <m:nor/>
+                        </m:rPr>
+                        <a:rPr lang="en-US" sz="2200" b="0" i="0" dirty="0" smtClean="0"/>
+                        <m:t>is</m:t>
+                      </m:r>
+                      <m:r>
+                        <m:rPr>
+                          <m:nor/>
+                        </m:rPr>
+                        <a:rPr lang="en-US" sz="2200" b="0" i="0" dirty="0" smtClean="0"/>
+                        <m:t> </m:t>
+                      </m:r>
+                      <m:r>
+                        <m:rPr>
+                          <m:nor/>
+                        </m:rPr>
+                        <a:rPr lang="en-US" sz="2200" b="0" i="0" dirty="0" smtClean="0"/>
+                        <m:t>function</m:t>
+                      </m:r>
+                      <m:r>
+                        <m:rPr>
+                          <m:nor/>
+                        </m:rPr>
+                        <a:rPr lang="en-US" sz="2200" b="0" i="0" dirty="0" smtClean="0"/>
+                        <m:t> </m:t>
+                      </m:r>
+                      <m:r>
+                        <m:rPr>
+                          <m:nor/>
+                        </m:rPr>
+                        <a:rPr lang="en-US" sz="2200" b="0" i="0" dirty="0" smtClean="0"/>
+                        <m:t>of</m:t>
+                      </m:r>
+                      <m:r>
+                        <m:rPr>
+                          <m:nor/>
+                        </m:rPr>
+                        <a:rPr lang="en-US" sz="2200" b="0" i="0" dirty="0" smtClean="0"/>
+                        <m:t> </m:t>
+                      </m:r>
+                      <m:r>
+                        <m:rPr>
+                          <m:nor/>
+                        </m:rPr>
+                        <a:rPr lang="en-US" sz="2200" b="0" i="0" dirty="0" smtClean="0"/>
+                        <m:t>linear</m:t>
+                      </m:r>
+                    </m:oMath>
+                  </m:oMathPara>
+                </a14:m>
+                <a:endParaRPr lang="en-US" sz="2200" dirty="0"/>
+              </a:p>
+              <a:p>
+                <a:endParaRPr lang="en-US" sz="2400" dirty="0"/>
+              </a:p>
+            </p:txBody>
+          </p:sp>
+        </mc:Choice>
+        <mc:Fallback>
+          <p:sp>
+            <p:nvSpPr>
+              <p:cNvPr id="9" name="TextBox 8"/>
+              <p:cNvSpPr txBox="1">
+                <a:spLocks noRot="1" noChangeAspect="1" noMove="1" noResize="1" noEditPoints="1" noAdjustHandles="1" noChangeArrowheads="1" noChangeShapeType="1" noTextEdit="1"/>
+              </p:cNvSpPr>
+              <p:nvPr/>
+            </p:nvSpPr>
+            <p:spPr>
+              <a:xfrm>
+                <a:off x="1725284" y="3479705"/>
+                <a:ext cx="6650966" cy="1153329"/>
+              </a:xfrm>
+              <a:prstGeom prst="rect">
+                <a:avLst/>
+              </a:prstGeom>
+              <a:blipFill rotWithShape="0">
+                <a:blip r:embed="rId5"/>
+                <a:stretch>
+                  <a:fillRect/>
+                </a:stretch>
+              </a:blipFill>
+            </p:spPr>
+            <p:txBody>
+              <a:bodyPr/>
+              <a:lstStyle/>
+              <a:p>
+                <a:r>
+                  <a:rPr lang="en-US">
+                    <a:noFill/>
+                  </a:rPr>
+                  <a:t> </a:t>
+                </a:r>
+              </a:p>
+            </p:txBody>
+          </p:sp>
+        </mc:Fallback>
+      </mc:AlternateContent>
+    </p:spTree>
+    <p:extLst>
+      <p:ext uri="{BB962C8B-B14F-4D97-AF65-F5344CB8AC3E}">
+        <p14:creationId xmlns:p14="http://schemas.microsoft.com/office/powerpoint/2010/main" val="560081981"/>
+      </p:ext>
+    </p:extLst>
+  </p:cSld>
+  <p:clrMapOvr>
+    <a:masterClrMapping/>
+  </p:clrMapOvr>
+</p:sld>
+</file>
+
+<file path=ppt/slides/slide8.xml><?xml version="1.0" encoding="utf-8"?>
+<p:sld xmlns:a="http://schemas.openxmlformats.org/drawingml/2006/main" xmlns:r="http://schemas.openxmlformats.org/officeDocument/2006/relationships" xmlns:p="http://schemas.openxmlformats.org/presentationml/2006/main">
+  <p:cSld>
+    <p:spTree>
+      <p:nvGrpSpPr>
+        <p:cNvPr id="1" name=""/>
+        <p:cNvGrpSpPr/>
+        <p:nvPr/>
+      </p:nvGrpSpPr>
+      <p:grpSpPr>
+        <a:xfrm>
+          <a:off x="0" y="0"/>
+          <a:ext cx="0" cy="0"/>
+          <a:chOff x="0" y="0"/>
+          <a:chExt cx="0" cy="0"/>
+        </a:xfrm>
+      </p:grpSpPr>
+      <p:sp>
+        <p:nvSpPr>
+          <p:cNvPr id="2" name="Title 1"/>
+          <p:cNvSpPr>
+            <a:spLocks noGrp="1"/>
+          </p:cNvSpPr>
+          <p:nvPr>
+            <p:ph type="title"/>
+          </p:nvPr>
+        </p:nvSpPr>
+        <p:spPr/>
+        <p:txBody>
+          <a:bodyPr/>
+          <a:lstStyle/>
+          <a:p>
+            <a:r>
               <a:rPr lang="en-US" dirty="0" smtClean="0"/>
               <a:t>Derivative </a:t>
             </a:r>
@@ -21406,7 +23315,7 @@
           <a:p>
             <a:fld id="{6376B962-9A28-45C6-BBAD-D5665CAF4927}" type="slidenum">
               <a:rPr lang="ko-KR" altLang="en-US" smtClean="0"/>
-              <a:t>7</a:t>
+              <a:t>8</a:t>
             </a:fld>
             <a:endParaRPr lang="ko-KR" altLang="en-US"/>
           </a:p>
@@ -23769,7 +25678,7 @@
 </p:sld>
 </file>
 
-<file path=ppt/slides/slide8.xml><?xml version="1.0" encoding="utf-8"?>
+<file path=ppt/slides/slide9.xml><?xml version="1.0" encoding="utf-8"?>
 <p:sld xmlns:a="http://schemas.openxmlformats.org/drawingml/2006/main" xmlns:r="http://schemas.openxmlformats.org/officeDocument/2006/relationships" xmlns:p="http://schemas.openxmlformats.org/presentationml/2006/main">
   <p:cSld>
     <p:spTree>
@@ -23853,7 +25762,7 @@
           <a:p>
             <a:fld id="{6376B962-9A28-45C6-BBAD-D5665CAF4927}" type="slidenum">
               <a:rPr lang="ko-KR" altLang="en-US" smtClean="0"/>
-              <a:t>8</a:t>
+              <a:t>9</a:t>
             </a:fld>
             <a:endParaRPr lang="ko-KR" altLang="en-US"/>
           </a:p>
@@ -27060,197 +28969,6 @@
 </p:sld>
 </file>
 
-<file path=ppt/slides/slide9.xml><?xml version="1.0" encoding="utf-8"?>
-<p:sld xmlns:a="http://schemas.openxmlformats.org/drawingml/2006/main" xmlns:r="http://schemas.openxmlformats.org/officeDocument/2006/relationships" xmlns:p="http://schemas.openxmlformats.org/presentationml/2006/main">
-  <p:cSld>
-    <p:spTree>
-      <p:nvGrpSpPr>
-        <p:cNvPr id="1" name=""/>
-        <p:cNvGrpSpPr/>
-        <p:nvPr/>
-      </p:nvGrpSpPr>
-      <p:grpSpPr>
-        <a:xfrm>
-          <a:off x="0" y="0"/>
-          <a:ext cx="0" cy="0"/>
-          <a:chOff x="0" y="0"/>
-          <a:chExt cx="0" cy="0"/>
-        </a:xfrm>
-      </p:grpSpPr>
-      <p:sp>
-        <p:nvSpPr>
-          <p:cNvPr id="2" name="Title 1"/>
-          <p:cNvSpPr>
-            <a:spLocks noGrp="1"/>
-          </p:cNvSpPr>
-          <p:nvPr>
-            <p:ph type="title"/>
-          </p:nvPr>
-        </p:nvSpPr>
-        <p:spPr/>
-        <p:txBody>
-          <a:bodyPr/>
-          <a:lstStyle/>
-          <a:p>
-            <a:endParaRPr lang="en-US" dirty="0"/>
-          </a:p>
-        </p:txBody>
-      </p:sp>
-      <p:sp>
-        <p:nvSpPr>
-          <p:cNvPr id="3" name="Content Placeholder 2"/>
-          <p:cNvSpPr>
-            <a:spLocks noGrp="1"/>
-          </p:cNvSpPr>
-          <p:nvPr>
-            <p:ph idx="1"/>
-          </p:nvPr>
-        </p:nvSpPr>
-        <p:spPr>
-          <a:scene3d>
-            <a:camera prst="orthographicFront"/>
-            <a:lightRig rig="threePt" dir="t"/>
-          </a:scene3d>
-          <a:sp3d>
-            <a:bevelT prst="angle"/>
-          </a:sp3d>
-        </p:spPr>
-        <p:txBody>
-          <a:bodyPr>
-            <a:sp3d extrusionH="57150">
-              <a:bevelT w="38100" h="38100" prst="slope"/>
-            </a:sp3d>
-          </a:bodyPr>
-          <a:lstStyle/>
-          <a:p>
-            <a:pPr marL="0" indent="0" algn="ctr">
-              <a:buNone/>
-            </a:pPr>
-            <a:endParaRPr lang="en-US" sz="5400" dirty="0" smtClean="0">
-              <a:solidFill>
-                <a:schemeClr val="tx2">
-                  <a:lumMod val="50000"/>
-                </a:schemeClr>
-              </a:solidFill>
-              <a:effectLst>
-                <a:innerShdw blurRad="63500" dist="50800" dir="10800000">
-                  <a:prstClr val="black">
-                    <a:alpha val="50000"/>
-                  </a:prstClr>
-                </a:innerShdw>
-                <a:reflection blurRad="6350" stA="55000" endA="300" endPos="45500" dir="5400000" sy="-100000" algn="bl" rotWithShape="0"/>
-              </a:effectLst>
-              <a:latin typeface="Times New Roman" panose="02020603050405020304" pitchFamily="18" charset="0"/>
-              <a:cs typeface="Times New Roman" panose="02020603050405020304" pitchFamily="18" charset="0"/>
-            </a:endParaRPr>
-          </a:p>
-          <a:p>
-            <a:pPr marL="0" indent="0" algn="ctr">
-              <a:buNone/>
-            </a:pPr>
-            <a:r>
-              <a:rPr lang="en-US" sz="5400" dirty="0" smtClean="0">
-                <a:solidFill>
-                  <a:schemeClr val="tx2">
-                    <a:lumMod val="50000"/>
-                  </a:schemeClr>
-                </a:solidFill>
-                <a:effectLst>
-                  <a:innerShdw blurRad="63500" dist="50800" dir="10800000">
-                    <a:prstClr val="black">
-                      <a:alpha val="50000"/>
-                    </a:prstClr>
-                  </a:innerShdw>
-                  <a:reflection blurRad="6350" stA="55000" endA="300" endPos="45500" dir="5400000" sy="-100000" algn="bl" rotWithShape="0"/>
-                </a:effectLst>
-                <a:latin typeface="Times New Roman" panose="02020603050405020304" pitchFamily="18" charset="0"/>
-                <a:cs typeface="Times New Roman" panose="02020603050405020304" pitchFamily="18" charset="0"/>
-              </a:rPr>
-              <a:t>Thank you for </a:t>
-            </a:r>
-            <a:r>
-              <a:rPr lang="en-US" sz="5400" dirty="0" smtClean="0">
-                <a:solidFill>
-                  <a:schemeClr val="tx2">
-                    <a:lumMod val="50000"/>
-                  </a:schemeClr>
-                </a:solidFill>
-                <a:effectLst>
-                  <a:innerShdw blurRad="63500" dist="50800" dir="18900000">
-                    <a:prstClr val="black">
-                      <a:alpha val="50000"/>
-                    </a:prstClr>
-                  </a:innerShdw>
-                  <a:reflection blurRad="6350" stA="55000" endA="300" endPos="45500" dir="5400000" sy="-100000" algn="bl" rotWithShape="0"/>
-                </a:effectLst>
-                <a:latin typeface="Times New Roman" panose="02020603050405020304" pitchFamily="18" charset="0"/>
-                <a:cs typeface="Times New Roman" panose="02020603050405020304" pitchFamily="18" charset="0"/>
-              </a:rPr>
-              <a:t>watching</a:t>
-            </a:r>
-            <a:endParaRPr lang="en-US" sz="5400" dirty="0">
-              <a:solidFill>
-                <a:schemeClr val="tx2">
-                  <a:lumMod val="50000"/>
-                </a:schemeClr>
-              </a:solidFill>
-              <a:effectLst>
-                <a:innerShdw blurRad="63500" dist="50800" dir="18900000">
-                  <a:prstClr val="black">
-                    <a:alpha val="50000"/>
-                  </a:prstClr>
-                </a:innerShdw>
-                <a:reflection blurRad="6350" stA="55000" endA="300" endPos="45500" dir="5400000" sy="-100000" algn="bl" rotWithShape="0"/>
-              </a:effectLst>
-              <a:latin typeface="Times New Roman" panose="02020603050405020304" pitchFamily="18" charset="0"/>
-              <a:cs typeface="Times New Roman" panose="02020603050405020304" pitchFamily="18" charset="0"/>
-            </a:endParaRPr>
-          </a:p>
-        </p:txBody>
-      </p:sp>
-      <p:sp>
-        <p:nvSpPr>
-          <p:cNvPr id="4" name="Slide Number Placeholder 3"/>
-          <p:cNvSpPr>
-            <a:spLocks noGrp="1"/>
-          </p:cNvSpPr>
-          <p:nvPr>
-            <p:ph type="sldNum" sz="quarter" idx="10"/>
-          </p:nvPr>
-        </p:nvSpPr>
-        <p:spPr/>
-        <p:txBody>
-          <a:bodyPr/>
-          <a:lstStyle/>
-          <a:p>
-            <a:fld id="{6376B962-9A28-45C6-BBAD-D5665CAF4927}" type="slidenum">
-              <a:rPr lang="ko-KR" altLang="en-US" smtClean="0"/>
-              <a:t>9</a:t>
-            </a:fld>
-            <a:endParaRPr lang="ko-KR" altLang="en-US"/>
-          </a:p>
-        </p:txBody>
-      </p:sp>
-    </p:spTree>
-    <p:extLst>
-      <p:ext uri="{BB962C8B-B14F-4D97-AF65-F5344CB8AC3E}">
-        <p14:creationId xmlns:p14="http://schemas.microsoft.com/office/powerpoint/2010/main" val="1436968073"/>
-      </p:ext>
-    </p:extLst>
-  </p:cSld>
-  <p:clrMapOvr>
-    <a:masterClrMapping/>
-  </p:clrMapOvr>
-  <p:timing>
-    <p:tnLst>
-      <p:par>
-        <p:cTn id="1" dur="indefinite" restart="never" nodeType="tmRoot"/>
-      </p:par>
-    </p:tnLst>
-  </p:timing>
-</p:sld>
-</file>
-
 <file path=ppt/theme/theme1.xml><?xml version="1.0" encoding="utf-8"?>
 <a:theme xmlns:a="http://schemas.openxmlformats.org/drawingml/2006/main" name="DLSG">
   <a:themeElements>

</xml_diff>